<commit_message>
working on foraging models + lineage turnover model (intercept version)
</commit_message>
<xml_diff>
--- a/docs/bounding_colony_locations.pptx
+++ b/docs/bounding_colony_locations.pptx
@@ -9,6 +9,9 @@
     <p:sldId id="257" r:id="rId3"/>
     <p:sldId id="259" r:id="rId4"/>
     <p:sldId id="258" r:id="rId5"/>
+    <p:sldId id="260" r:id="rId6"/>
+    <p:sldId id="262" r:id="rId7"/>
+    <p:sldId id="261" r:id="rId8"/>
   </p:sldIdLst>
   <p:sldSz cx="12192000" cy="6858000"/>
   <p:notesSz cx="6858000" cy="9144000"/>
@@ -8207,6 +8210,353 @@
 </p:sld>
 </file>
 
+<file path=ppt/slides/slide5.xml><?xml version="1.0" encoding="utf-8"?>
+<p:sld xmlns:a="http://schemas.openxmlformats.org/drawingml/2006/main" xmlns:r="http://schemas.openxmlformats.org/officeDocument/2006/relationships" xmlns:p="http://schemas.openxmlformats.org/presentationml/2006/main">
+  <p:cSld>
+    <p:spTree>
+      <p:nvGrpSpPr>
+        <p:cNvPr id="1" name=""/>
+        <p:cNvGrpSpPr/>
+        <p:nvPr/>
+      </p:nvGrpSpPr>
+      <p:grpSpPr>
+        <a:xfrm>
+          <a:off x="0" y="0"/>
+          <a:ext cx="0" cy="0"/>
+          <a:chOff x="0" y="0"/>
+          <a:chExt cx="0" cy="0"/>
+        </a:xfrm>
+      </p:grpSpPr>
+      <p:pic>
+        <p:nvPicPr>
+          <p:cNvPr id="5" name="Picture 4" descr="A group of blue and green circles&#10;&#10;AI-generated content may be incorrect.">
+            <a:extLst>
+              <a:ext uri="{FF2B5EF4-FFF2-40B4-BE49-F238E27FC236}">
+                <a16:creationId xmlns:a16="http://schemas.microsoft.com/office/drawing/2014/main" id="{906C2F0A-4E83-461A-2E01-76140448FE41}"/>
+              </a:ext>
+            </a:extLst>
+          </p:cNvPr>
+          <p:cNvPicPr>
+            <a:picLocks noChangeAspect="1"/>
+          </p:cNvPicPr>
+          <p:nvPr/>
+        </p:nvPicPr>
+        <p:blipFill>
+          <a:blip r:embed="rId2"/>
+          <a:srcRect l="5235" r="8806"/>
+          <a:stretch>
+            <a:fillRect/>
+          </a:stretch>
+        </p:blipFill>
+        <p:spPr>
+          <a:xfrm>
+            <a:off x="-1" y="0"/>
+            <a:ext cx="12192001" cy="6450227"/>
+          </a:xfrm>
+          <a:prstGeom prst="rect">
+            <a:avLst/>
+          </a:prstGeom>
+        </p:spPr>
+      </p:pic>
+      <p:sp>
+        <p:nvSpPr>
+          <p:cNvPr id="8" name="TextBox 7">
+            <a:extLst>
+              <a:ext uri="{FF2B5EF4-FFF2-40B4-BE49-F238E27FC236}">
+                <a16:creationId xmlns:a16="http://schemas.microsoft.com/office/drawing/2014/main" id="{CD88A4AF-C3C4-3CF8-0107-88441B6F664D}"/>
+              </a:ext>
+            </a:extLst>
+          </p:cNvPr>
+          <p:cNvSpPr txBox="1"/>
+          <p:nvPr/>
+        </p:nvSpPr>
+        <p:spPr>
+          <a:xfrm>
+            <a:off x="8723870" y="6450227"/>
+            <a:ext cx="3372333" cy="369332"/>
+          </a:xfrm>
+          <a:prstGeom prst="rect">
+            <a:avLst/>
+          </a:prstGeom>
+          <a:noFill/>
+        </p:spPr>
+        <p:txBody>
+          <a:bodyPr wrap="none" rtlCol="0">
+            <a:spAutoFit/>
+          </a:bodyPr>
+          <a:lstStyle/>
+          <a:p>
+            <a:r>
+              <a:rPr lang="en-US" dirty="0"/>
+              <a:t>With “uniform” prior </a:t>
+            </a:r>
+            <a:r>
+              <a:rPr lang="en-US"/>
+              <a:t>on distance</a:t>
+            </a:r>
+            <a:endParaRPr lang="en-US" dirty="0"/>
+          </a:p>
+        </p:txBody>
+      </p:sp>
+      <p:sp>
+        <p:nvSpPr>
+          <p:cNvPr id="9" name="TextBox 8">
+            <a:extLst>
+              <a:ext uri="{FF2B5EF4-FFF2-40B4-BE49-F238E27FC236}">
+                <a16:creationId xmlns:a16="http://schemas.microsoft.com/office/drawing/2014/main" id="{FCA5104F-AC4A-8A3A-C6B8-8F6FF872F71C}"/>
+              </a:ext>
+            </a:extLst>
+          </p:cNvPr>
+          <p:cNvSpPr txBox="1"/>
+          <p:nvPr/>
+        </p:nvSpPr>
+        <p:spPr>
+          <a:xfrm>
+            <a:off x="1594022" y="407773"/>
+            <a:ext cx="1335622" cy="369332"/>
+          </a:xfrm>
+          <a:prstGeom prst="rect">
+            <a:avLst/>
+          </a:prstGeom>
+          <a:noFill/>
+        </p:spPr>
+        <p:txBody>
+          <a:bodyPr wrap="none" rtlCol="0">
+            <a:spAutoFit/>
+          </a:bodyPr>
+          <a:lstStyle/>
+          <a:p>
+            <a:r>
+              <a:rPr lang="en-US" dirty="0">
+                <a:solidFill>
+                  <a:schemeClr val="bg1"/>
+                </a:solidFill>
+              </a:rPr>
+              <a:t>All colonies</a:t>
+            </a:r>
+          </a:p>
+        </p:txBody>
+      </p:sp>
+    </p:spTree>
+    <p:extLst>
+      <p:ext uri="{BB962C8B-B14F-4D97-AF65-F5344CB8AC3E}">
+        <p14:creationId xmlns:p14="http://schemas.microsoft.com/office/powerpoint/2010/main" val="2494711743"/>
+      </p:ext>
+    </p:extLst>
+  </p:cSld>
+  <p:clrMapOvr>
+    <a:masterClrMapping/>
+  </p:clrMapOvr>
+</p:sld>
+</file>
+
+<file path=ppt/slides/slide6.xml><?xml version="1.0" encoding="utf-8"?>
+<p:sld xmlns:a="http://schemas.openxmlformats.org/drawingml/2006/main" xmlns:r="http://schemas.openxmlformats.org/officeDocument/2006/relationships" xmlns:p="http://schemas.openxmlformats.org/presentationml/2006/main">
+  <p:cSld>
+    <p:spTree>
+      <p:nvGrpSpPr>
+        <p:cNvPr id="1" name=""/>
+        <p:cNvGrpSpPr/>
+        <p:nvPr/>
+      </p:nvGrpSpPr>
+      <p:grpSpPr>
+        <a:xfrm>
+          <a:off x="0" y="0"/>
+          <a:ext cx="0" cy="0"/>
+          <a:chOff x="0" y="0"/>
+          <a:chExt cx="0" cy="0"/>
+        </a:xfrm>
+      </p:grpSpPr>
+      <p:pic>
+        <p:nvPicPr>
+          <p:cNvPr id="4" name="Picture 3">
+            <a:extLst>
+              <a:ext uri="{FF2B5EF4-FFF2-40B4-BE49-F238E27FC236}">
+                <a16:creationId xmlns:a16="http://schemas.microsoft.com/office/drawing/2014/main" id="{35DA2925-E907-4B97-DDB1-DBEFE5D07282}"/>
+              </a:ext>
+            </a:extLst>
+          </p:cNvPr>
+          <p:cNvPicPr>
+            <a:picLocks noChangeAspect="1"/>
+          </p:cNvPicPr>
+          <p:nvPr/>
+        </p:nvPicPr>
+        <p:blipFill>
+          <a:blip r:embed="rId2">
+            <a:alphaModFix/>
+          </a:blip>
+          <a:srcRect r="3944"/>
+          <a:stretch>
+            <a:fillRect/>
+          </a:stretch>
+        </p:blipFill>
+        <p:spPr>
+          <a:xfrm>
+            <a:off x="14143" y="12310"/>
+            <a:ext cx="12177857" cy="6450226"/>
+          </a:xfrm>
+          <a:prstGeom prst="rect">
+            <a:avLst/>
+          </a:prstGeom>
+        </p:spPr>
+      </p:pic>
+      <p:sp>
+        <p:nvSpPr>
+          <p:cNvPr id="5" name="TextBox 4">
+            <a:extLst>
+              <a:ext uri="{FF2B5EF4-FFF2-40B4-BE49-F238E27FC236}">
+                <a16:creationId xmlns:a16="http://schemas.microsoft.com/office/drawing/2014/main" id="{529D999A-82CF-20C9-4AFC-E76B60B59CA6}"/>
+              </a:ext>
+            </a:extLst>
+          </p:cNvPr>
+          <p:cNvSpPr txBox="1"/>
+          <p:nvPr/>
+        </p:nvSpPr>
+        <p:spPr>
+          <a:xfrm>
+            <a:off x="1594022" y="407773"/>
+            <a:ext cx="1335622" cy="369332"/>
+          </a:xfrm>
+          <a:prstGeom prst="rect">
+            <a:avLst/>
+          </a:prstGeom>
+          <a:noFill/>
+        </p:spPr>
+        <p:txBody>
+          <a:bodyPr wrap="none" rtlCol="0">
+            <a:spAutoFit/>
+          </a:bodyPr>
+          <a:lstStyle/>
+          <a:p>
+            <a:r>
+              <a:rPr lang="en-US" dirty="0">
+                <a:solidFill>
+                  <a:schemeClr val="bg1"/>
+                </a:solidFill>
+              </a:rPr>
+              <a:t>All colonies</a:t>
+            </a:r>
+          </a:p>
+        </p:txBody>
+      </p:sp>
+      <p:sp>
+        <p:nvSpPr>
+          <p:cNvPr id="6" name="TextBox 5">
+            <a:extLst>
+              <a:ext uri="{FF2B5EF4-FFF2-40B4-BE49-F238E27FC236}">
+                <a16:creationId xmlns:a16="http://schemas.microsoft.com/office/drawing/2014/main" id="{31AFB87E-2870-385D-4139-E8073696BC19}"/>
+              </a:ext>
+            </a:extLst>
+          </p:cNvPr>
+          <p:cNvSpPr txBox="1"/>
+          <p:nvPr/>
+        </p:nvSpPr>
+        <p:spPr>
+          <a:xfrm>
+            <a:off x="8723870" y="6450227"/>
+            <a:ext cx="3502241" cy="369332"/>
+          </a:xfrm>
+          <a:prstGeom prst="rect">
+            <a:avLst/>
+          </a:prstGeom>
+          <a:noFill/>
+        </p:spPr>
+        <p:txBody>
+          <a:bodyPr wrap="none" rtlCol="0">
+            <a:spAutoFit/>
+          </a:bodyPr>
+          <a:lstStyle/>
+          <a:p>
+            <a:r>
+              <a:rPr lang="en-US" dirty="0"/>
+              <a:t>With </a:t>
+            </a:r>
+            <a:r>
+              <a:rPr lang="en-US" dirty="0" err="1"/>
+              <a:t>halfnormal</a:t>
+            </a:r>
+            <a:r>
+              <a:rPr lang="en-US" dirty="0"/>
+              <a:t> prior on distance</a:t>
+            </a:r>
+          </a:p>
+        </p:txBody>
+      </p:sp>
+    </p:spTree>
+    <p:extLst>
+      <p:ext uri="{BB962C8B-B14F-4D97-AF65-F5344CB8AC3E}">
+        <p14:creationId xmlns:p14="http://schemas.microsoft.com/office/powerpoint/2010/main" val="1073753470"/>
+      </p:ext>
+    </p:extLst>
+  </p:cSld>
+  <p:clrMapOvr>
+    <a:masterClrMapping/>
+  </p:clrMapOvr>
+</p:sld>
+</file>
+
+<file path=ppt/slides/slide7.xml><?xml version="1.0" encoding="utf-8"?>
+<p:sld xmlns:a="http://schemas.openxmlformats.org/drawingml/2006/main" xmlns:r="http://schemas.openxmlformats.org/officeDocument/2006/relationships" xmlns:p="http://schemas.openxmlformats.org/presentationml/2006/main">
+  <p:cSld>
+    <p:spTree>
+      <p:nvGrpSpPr>
+        <p:cNvPr id="1" name=""/>
+        <p:cNvGrpSpPr/>
+        <p:nvPr/>
+      </p:nvGrpSpPr>
+      <p:grpSpPr>
+        <a:xfrm>
+          <a:off x="0" y="0"/>
+          <a:ext cx="0" cy="0"/>
+          <a:chOff x="0" y="0"/>
+          <a:chExt cx="0" cy="0"/>
+        </a:xfrm>
+      </p:grpSpPr>
+      <p:pic>
+        <p:nvPicPr>
+          <p:cNvPr id="4" name="Picture 3">
+            <a:extLst>
+              <a:ext uri="{FF2B5EF4-FFF2-40B4-BE49-F238E27FC236}">
+                <a16:creationId xmlns:a16="http://schemas.microsoft.com/office/drawing/2014/main" id="{8043A77D-44DF-C705-75F0-02B6AC097D02}"/>
+              </a:ext>
+            </a:extLst>
+          </p:cNvPr>
+          <p:cNvPicPr>
+            <a:picLocks noChangeAspect="1"/>
+          </p:cNvPicPr>
+          <p:nvPr/>
+        </p:nvPicPr>
+        <p:blipFill>
+          <a:blip r:embed="rId2">
+            <a:alphaModFix/>
+          </a:blip>
+          <a:stretch>
+            <a:fillRect/>
+          </a:stretch>
+        </p:blipFill>
+        <p:spPr>
+          <a:xfrm>
+            <a:off x="-704335" y="0"/>
+            <a:ext cx="14111416" cy="6450227"/>
+          </a:xfrm>
+          <a:prstGeom prst="rect">
+            <a:avLst/>
+          </a:prstGeom>
+        </p:spPr>
+      </p:pic>
+    </p:spTree>
+    <p:extLst>
+      <p:ext uri="{BB962C8B-B14F-4D97-AF65-F5344CB8AC3E}">
+        <p14:creationId xmlns:p14="http://schemas.microsoft.com/office/powerpoint/2010/main" val="3884319733"/>
+      </p:ext>
+    </p:extLst>
+  </p:cSld>
+  <p:clrMapOvr>
+    <a:masterClrMapping/>
+  </p:clrMapOvr>
+</p:sld>
+</file>
+
 <file path=ppt/theme/theme1.xml><?xml version="1.0" encoding="utf-8"?>
 <a:theme xmlns:a="http://schemas.openxmlformats.org/drawingml/2006/main" name="Office Theme">
   <a:themeElements>

</xml_diff>

<commit_message>
ahhhhh I've been using a bad coordinate reference system :'(
</commit_message>
<xml_diff>
--- a/docs/bounding_colony_locations.pptx
+++ b/docs/bounding_colony_locations.pptx
@@ -12,6 +12,7 @@
     <p:sldId id="260" r:id="rId6"/>
     <p:sldId id="262" r:id="rId7"/>
     <p:sldId id="261" r:id="rId8"/>
+    <p:sldId id="263" r:id="rId9"/>
   </p:sldIdLst>
   <p:sldSz cx="12192000" cy="6858000"/>
   <p:notesSz cx="6858000" cy="9144000"/>
@@ -8288,13 +8289,8 @@
           <a:p>
             <a:r>
               <a:rPr lang="en-US" dirty="0"/>
-              <a:t>With “uniform” prior </a:t>
-            </a:r>
-            <a:r>
-              <a:rPr lang="en-US"/>
-              <a:t>on distance</a:t>
-            </a:r>
-            <a:endParaRPr lang="en-US" dirty="0"/>
+              <a:t>With “uniform” prior on distance</a:t>
+            </a:r>
           </a:p>
         </p:txBody>
       </p:sp>
@@ -8548,6 +8544,66 @@
     <p:extLst>
       <p:ext uri="{BB962C8B-B14F-4D97-AF65-F5344CB8AC3E}">
         <p14:creationId xmlns:p14="http://schemas.microsoft.com/office/powerpoint/2010/main" val="3884319733"/>
+      </p:ext>
+    </p:extLst>
+  </p:cSld>
+  <p:clrMapOvr>
+    <a:masterClrMapping/>
+  </p:clrMapOvr>
+</p:sld>
+</file>
+
+<file path=ppt/slides/slide8.xml><?xml version="1.0" encoding="utf-8"?>
+<p:sld xmlns:a="http://schemas.openxmlformats.org/drawingml/2006/main" xmlns:r="http://schemas.openxmlformats.org/officeDocument/2006/relationships" xmlns:p="http://schemas.openxmlformats.org/presentationml/2006/main">
+  <p:cSld>
+    <p:spTree>
+      <p:nvGrpSpPr>
+        <p:cNvPr id="1" name=""/>
+        <p:cNvGrpSpPr/>
+        <p:nvPr/>
+      </p:nvGrpSpPr>
+      <p:grpSpPr>
+        <a:xfrm>
+          <a:off x="0" y="0"/>
+          <a:ext cx="0" cy="0"/>
+          <a:chOff x="0" y="0"/>
+          <a:chExt cx="0" cy="0"/>
+        </a:xfrm>
+      </p:grpSpPr>
+      <p:pic>
+        <p:nvPicPr>
+          <p:cNvPr id="4" name="Picture 3">
+            <a:extLst>
+              <a:ext uri="{FF2B5EF4-FFF2-40B4-BE49-F238E27FC236}">
+                <a16:creationId xmlns:a16="http://schemas.microsoft.com/office/drawing/2014/main" id="{47500B1E-BB1C-4EE3-852F-5FB90E399B37}"/>
+              </a:ext>
+            </a:extLst>
+          </p:cNvPr>
+          <p:cNvPicPr>
+            <a:picLocks noChangeAspect="1"/>
+          </p:cNvPicPr>
+          <p:nvPr/>
+        </p:nvPicPr>
+        <p:blipFill>
+          <a:blip r:embed="rId2"/>
+          <a:stretch>
+            <a:fillRect/>
+          </a:stretch>
+        </p:blipFill>
+        <p:spPr>
+          <a:xfrm>
+            <a:off x="2649475" y="0"/>
+            <a:ext cx="6893049" cy="6858000"/>
+          </a:xfrm>
+          <a:prstGeom prst="rect">
+            <a:avLst/>
+          </a:prstGeom>
+        </p:spPr>
+      </p:pic>
+    </p:spTree>
+    <p:extLst>
+      <p:ext uri="{BB962C8B-B14F-4D97-AF65-F5344CB8AC3E}">
+        <p14:creationId xmlns:p14="http://schemas.microsoft.com/office/powerpoint/2010/main" val="3800070388"/>
       </p:ext>
     </p:extLst>
   </p:cSld>

</xml_diff>

<commit_message>
remove large .DAT files from git repo for syncing to overleaf
</commit_message>
<xml_diff>
--- a/docs/bounding_colony_locations.pptx
+++ b/docs/bounding_colony_locations.pptx
@@ -7,7 +7,7 @@
   <p:sldIdLst>
     <p:sldId id="256" r:id="rId2"/>
     <p:sldId id="257" r:id="rId3"/>
-    <p:sldId id="259" r:id="rId4"/>
+    <p:sldId id="266" r:id="rId4"/>
     <p:sldId id="258" r:id="rId5"/>
     <p:sldId id="260" r:id="rId6"/>
     <p:sldId id="262" r:id="rId7"/>
@@ -4226,66 +4226,6 @@
           <a:chExt cx="0" cy="0"/>
         </a:xfrm>
       </p:grpSpPr>
-      <p:pic>
-        <p:nvPicPr>
-          <p:cNvPr id="22" name="Picture 21" descr="A green and black dotted diagram&#10;&#10;AI-generated content may be incorrect.">
-            <a:extLst>
-              <a:ext uri="{FF2B5EF4-FFF2-40B4-BE49-F238E27FC236}">
-                <a16:creationId xmlns:a16="http://schemas.microsoft.com/office/drawing/2014/main" id="{875993E0-1D29-4021-DD9A-A9E883206BBB}"/>
-              </a:ext>
-            </a:extLst>
-          </p:cNvPr>
-          <p:cNvPicPr>
-            <a:picLocks noChangeAspect="1"/>
-          </p:cNvPicPr>
-          <p:nvPr/>
-        </p:nvPicPr>
-        <p:blipFill>
-          <a:blip r:embed="rId2"/>
-          <a:stretch>
-            <a:fillRect/>
-          </a:stretch>
-        </p:blipFill>
-        <p:spPr>
-          <a:xfrm>
-            <a:off x="1980655" y="3665597"/>
-            <a:ext cx="4062793" cy="2958106"/>
-          </a:xfrm>
-          <a:prstGeom prst="rect">
-            <a:avLst/>
-          </a:prstGeom>
-        </p:spPr>
-      </p:pic>
-      <p:pic>
-        <p:nvPicPr>
-          <p:cNvPr id="11" name="Picture 10" descr="A green dotted diagram with black dots&#10;&#10;AI-generated content may be incorrect.">
-            <a:extLst>
-              <a:ext uri="{FF2B5EF4-FFF2-40B4-BE49-F238E27FC236}">
-                <a16:creationId xmlns:a16="http://schemas.microsoft.com/office/drawing/2014/main" id="{F95EADE3-DB88-129F-9111-D7CF5931026D}"/>
-              </a:ext>
-            </a:extLst>
-          </p:cNvPr>
-          <p:cNvPicPr>
-            <a:picLocks noChangeAspect="1"/>
-          </p:cNvPicPr>
-          <p:nvPr/>
-        </p:nvPicPr>
-        <p:blipFill>
-          <a:blip r:embed="rId3"/>
-          <a:stretch>
-            <a:fillRect/>
-          </a:stretch>
-        </p:blipFill>
-        <p:spPr>
-          <a:xfrm>
-            <a:off x="1546205" y="520359"/>
-            <a:ext cx="4942277" cy="2908641"/>
-          </a:xfrm>
-          <a:prstGeom prst="rect">
-            <a:avLst/>
-          </a:prstGeom>
-        </p:spPr>
-      </p:pic>
       <mc:AlternateContent xmlns:mc="http://schemas.openxmlformats.org/markup-compatibility/2006">
         <mc:Choice xmlns:a14="http://schemas.microsoft.com/office/drawing/2010/main" Requires="a14">
           <p:sp>
@@ -4302,8 +4242,8 @@
             </p:nvSpPr>
             <p:spPr>
               <a:xfrm>
-                <a:off x="142608" y="975177"/>
-                <a:ext cx="2066207" cy="461024"/>
+                <a:off x="427705" y="4356420"/>
+                <a:ext cx="2007408" cy="459421"/>
               </a:xfrm>
               <a:prstGeom prst="rect">
                 <a:avLst/>
@@ -4360,22 +4300,43 @@
                         </a:rPr>
                         <m:t>~</m:t>
                       </m:r>
-                      <m:r>
-                        <m:rPr>
-                          <m:sty m:val="p"/>
-                        </m:rPr>
-                        <a:rPr lang="en-CA" sz="1600" b="0" i="1" smtClean="0">
-                          <a:latin typeface="Cambria Math" panose="02040503050406030204" pitchFamily="18" charset="0"/>
-                          <a:ea typeface="Cambria Math" panose="02040503050406030204" pitchFamily="18" charset="0"/>
-                        </a:rPr>
-                        <m:t>normal</m:t>
-                      </m:r>
+                      <m:sSup>
+                        <m:sSupPr>
+                          <m:ctrlPr>
+                            <a:rPr lang="en-CA" sz="1600" b="0" i="1" smtClean="0">
+                              <a:latin typeface="Cambria Math" panose="02040503050406030204" pitchFamily="18" charset="0"/>
+                              <a:ea typeface="Cambria Math" panose="02040503050406030204" pitchFamily="18" charset="0"/>
+                            </a:rPr>
+                          </m:ctrlPr>
+                        </m:sSupPr>
+                        <m:e>
+                          <m:r>
+                            <m:rPr>
+                              <m:sty m:val="p"/>
+                            </m:rPr>
+                            <a:rPr lang="en-CA" sz="1600" b="0" i="1" smtClean="0">
+                              <a:latin typeface="Cambria Math" panose="02040503050406030204" pitchFamily="18" charset="0"/>
+                              <a:ea typeface="Cambria Math" panose="02040503050406030204" pitchFamily="18" charset="0"/>
+                            </a:rPr>
+                            <m:t>normal</m:t>
+                          </m:r>
+                        </m:e>
+                        <m:sup>
+                          <m:r>
+                            <a:rPr lang="en-CA" sz="1600" b="0" i="1" smtClean="0">
+                              <a:latin typeface="Cambria Math" panose="02040503050406030204" pitchFamily="18" charset="0"/>
+                              <a:ea typeface="Cambria Math" panose="02040503050406030204" pitchFamily="18" charset="0"/>
+                            </a:rPr>
+                            <m:t>+</m:t>
+                          </m:r>
+                        </m:sup>
+                      </m:sSup>
                       <m:r>
                         <a:rPr lang="en-CA" sz="1600" b="0" i="1" smtClean="0">
                           <a:latin typeface="Cambria Math" panose="02040503050406030204" pitchFamily="18" charset="0"/>
                           <a:ea typeface="Cambria Math" panose="02040503050406030204" pitchFamily="18" charset="0"/>
                         </a:rPr>
-                        <m:t>**(0, </m:t>
+                        <m:t>(0, </m:t>
                       </m:r>
                       <m:f>
                         <m:fPr>
@@ -4428,7 +4389,7 @@
                               <a:latin typeface="Cambria Math" panose="02040503050406030204" pitchFamily="18" charset="0"/>
                               <a:ea typeface="Cambria Math" panose="02040503050406030204" pitchFamily="18" charset="0"/>
                             </a:rPr>
-                            <m:t>3</m:t>
+                            <m:t>2.58</m:t>
                           </m:r>
                         </m:den>
                       </m:f>
@@ -4464,16 +4425,16 @@
             </p:nvSpPr>
             <p:spPr>
               <a:xfrm>
-                <a:off x="142608" y="975177"/>
-                <a:ext cx="2066207" cy="461024"/>
+                <a:off x="427705" y="4356420"/>
+                <a:ext cx="2007408" cy="459421"/>
               </a:xfrm>
               <a:prstGeom prst="rect">
                 <a:avLst/>
               </a:prstGeom>
               <a:blipFill>
-                <a:blip r:embed="rId4"/>
+                <a:blip r:embed="rId2"/>
                 <a:stretch>
-                  <a:fillRect l="-2454" t="-2632" r="-3681" b="-10526"/>
+                  <a:fillRect l="-1887" t="-5405" r="-3774" b="-13514"/>
                 </a:stretch>
               </a:blipFill>
             </p:spPr>
@@ -4657,7 +4618,7 @@
                 <a:avLst/>
               </a:prstGeom>
               <a:blipFill>
-                <a:blip r:embed="rId5"/>
+                <a:blip r:embed="rId3"/>
                 <a:stretch>
                   <a:fillRect l="-2778" t="-3846" b="-13462"/>
                 </a:stretch>
@@ -4678,173 +4639,6 @@
           </p:sp>
         </mc:Fallback>
       </mc:AlternateContent>
-      <p:pic>
-        <p:nvPicPr>
-          <p:cNvPr id="9" name="Picture 8" descr="A graph with black dots and numbers&#10;&#10;AI-generated content may be incorrect.">
-            <a:extLst>
-              <a:ext uri="{FF2B5EF4-FFF2-40B4-BE49-F238E27FC236}">
-                <a16:creationId xmlns:a16="http://schemas.microsoft.com/office/drawing/2014/main" id="{4D343AB3-852C-E281-CE81-589148B1232D}"/>
-              </a:ext>
-            </a:extLst>
-          </p:cNvPr>
-          <p:cNvPicPr>
-            <a:picLocks noChangeAspect="1"/>
-          </p:cNvPicPr>
-          <p:nvPr/>
-        </p:nvPicPr>
-        <p:blipFill>
-          <a:blip r:embed="rId6"/>
-          <a:srcRect r="11576"/>
-          <a:stretch>
-            <a:fillRect/>
-          </a:stretch>
-        </p:blipFill>
-        <p:spPr>
-          <a:xfrm>
-            <a:off x="8659597" y="520359"/>
-            <a:ext cx="3532403" cy="2908641"/>
-          </a:xfrm>
-          <a:prstGeom prst="rect">
-            <a:avLst/>
-          </a:prstGeom>
-        </p:spPr>
-      </p:pic>
-      <p:pic>
-        <p:nvPicPr>
-          <p:cNvPr id="7" name="Picture 6" descr="A graph with a dotted line&#10;&#10;AI-generated content may be incorrect.">
-            <a:extLst>
-              <a:ext uri="{FF2B5EF4-FFF2-40B4-BE49-F238E27FC236}">
-                <a16:creationId xmlns:a16="http://schemas.microsoft.com/office/drawing/2014/main" id="{7C2C1868-888D-DA90-039F-0268180AD7C5}"/>
-              </a:ext>
-            </a:extLst>
-          </p:cNvPr>
-          <p:cNvPicPr>
-            <a:picLocks noChangeAspect="1"/>
-          </p:cNvPicPr>
-          <p:nvPr/>
-        </p:nvPicPr>
-        <p:blipFill>
-          <a:blip r:embed="rId7"/>
-          <a:srcRect l="19170" r="20155"/>
-          <a:stretch>
-            <a:fillRect/>
-          </a:stretch>
-        </p:blipFill>
-        <p:spPr>
-          <a:xfrm>
-            <a:off x="5829033" y="520359"/>
-            <a:ext cx="2998725" cy="2908641"/>
-          </a:xfrm>
-          <a:prstGeom prst="rect">
-            <a:avLst/>
-          </a:prstGeom>
-        </p:spPr>
-      </p:pic>
-      <p:sp>
-        <p:nvSpPr>
-          <p:cNvPr id="12" name="TextBox 11">
-            <a:extLst>
-              <a:ext uri="{FF2B5EF4-FFF2-40B4-BE49-F238E27FC236}">
-                <a16:creationId xmlns:a16="http://schemas.microsoft.com/office/drawing/2014/main" id="{3837D124-C056-197F-550B-0BA09B1D2871}"/>
-              </a:ext>
-            </a:extLst>
-          </p:cNvPr>
-          <p:cNvSpPr txBox="1"/>
-          <p:nvPr/>
-        </p:nvSpPr>
-        <p:spPr>
-          <a:xfrm>
-            <a:off x="3710152" y="147145"/>
-            <a:ext cx="1435458" cy="369332"/>
-          </a:xfrm>
-          <a:prstGeom prst="rect">
-            <a:avLst/>
-          </a:prstGeom>
-          <a:noFill/>
-        </p:spPr>
-        <p:txBody>
-          <a:bodyPr wrap="none" rtlCol="0">
-            <a:spAutoFit/>
-          </a:bodyPr>
-          <a:lstStyle/>
-          <a:p>
-            <a:r>
-              <a:rPr lang="en-US" dirty="0"/>
-              <a:t>colony 1024 </a:t>
-            </a:r>
-          </a:p>
-        </p:txBody>
-      </p:sp>
-      <p:sp>
-        <p:nvSpPr>
-          <p:cNvPr id="13" name="TextBox 12">
-            <a:extLst>
-              <a:ext uri="{FF2B5EF4-FFF2-40B4-BE49-F238E27FC236}">
-                <a16:creationId xmlns:a16="http://schemas.microsoft.com/office/drawing/2014/main" id="{061F21CB-E9B2-2E2E-2320-99D8CB930209}"/>
-              </a:ext>
-            </a:extLst>
-          </p:cNvPr>
-          <p:cNvSpPr txBox="1"/>
-          <p:nvPr/>
-        </p:nvSpPr>
-        <p:spPr>
-          <a:xfrm>
-            <a:off x="6768662" y="147145"/>
-            <a:ext cx="1388970" cy="369332"/>
-          </a:xfrm>
-          <a:prstGeom prst="rect">
-            <a:avLst/>
-          </a:prstGeom>
-          <a:noFill/>
-        </p:spPr>
-        <p:txBody>
-          <a:bodyPr wrap="none" rtlCol="0">
-            <a:spAutoFit/>
-          </a:bodyPr>
-          <a:lstStyle/>
-          <a:p>
-            <a:r>
-              <a:rPr lang="en-US" dirty="0"/>
-              <a:t>colony 1373</a:t>
-            </a:r>
-          </a:p>
-        </p:txBody>
-      </p:sp>
-      <p:sp>
-        <p:nvSpPr>
-          <p:cNvPr id="14" name="TextBox 13">
-            <a:extLst>
-              <a:ext uri="{FF2B5EF4-FFF2-40B4-BE49-F238E27FC236}">
-                <a16:creationId xmlns:a16="http://schemas.microsoft.com/office/drawing/2014/main" id="{B3EFF4F0-E4ED-A9E4-2996-C89270BEDAC3}"/>
-              </a:ext>
-            </a:extLst>
-          </p:cNvPr>
-          <p:cNvSpPr txBox="1"/>
-          <p:nvPr/>
-        </p:nvSpPr>
-        <p:spPr>
-          <a:xfrm>
-            <a:off x="10076825" y="147145"/>
-            <a:ext cx="1388970" cy="369332"/>
-          </a:xfrm>
-          <a:prstGeom prst="rect">
-            <a:avLst/>
-          </a:prstGeom>
-          <a:noFill/>
-        </p:spPr>
-        <p:txBody>
-          <a:bodyPr wrap="none" rtlCol="0">
-            <a:spAutoFit/>
-          </a:bodyPr>
-          <a:lstStyle/>
-          <a:p>
-            <a:r>
-              <a:rPr lang="en-US" dirty="0"/>
-              <a:t>colony 1399</a:t>
-            </a:r>
-          </a:p>
-        </p:txBody>
-      </p:sp>
       <mc:AlternateContent xmlns:mc="http://schemas.openxmlformats.org/markup-compatibility/2006">
         <mc:Choice xmlns:a14="http://schemas.microsoft.com/office/drawing/2010/main" Requires="a14">
           <p:sp>
@@ -4861,7 +4655,7 @@
             </p:nvSpPr>
             <p:spPr>
               <a:xfrm>
-                <a:off x="121994" y="4009256"/>
+                <a:off x="164873" y="1136464"/>
                 <a:ext cx="2136739" cy="246221"/>
               </a:xfrm>
               <a:prstGeom prst="rect">
@@ -5002,16 +4796,16 @@
             </p:nvSpPr>
             <p:spPr>
               <a:xfrm>
-                <a:off x="121994" y="4009256"/>
+                <a:off x="164873" y="1136464"/>
                 <a:ext cx="2136739" cy="246221"/>
               </a:xfrm>
               <a:prstGeom prst="rect">
                 <a:avLst/>
               </a:prstGeom>
               <a:blipFill>
-                <a:blip r:embed="rId8"/>
+                <a:blip r:embed="rId4"/>
                 <a:stretch>
-                  <a:fillRect l="-1765" r="-2353" b="-33333"/>
+                  <a:fillRect l="-1765" r="-2941" b="-40000"/>
                 </a:stretch>
               </a:blipFill>
             </p:spPr>
@@ -5046,7 +4840,7 @@
             </p:nvSpPr>
             <p:spPr>
               <a:xfrm>
-                <a:off x="531569" y="4255477"/>
+                <a:off x="574448" y="1382685"/>
                 <a:ext cx="1328825" cy="369332"/>
               </a:xfrm>
               <a:prstGeom prst="rect">
@@ -5078,7 +4872,7 @@
                           <a:latin typeface="Cambria Math" panose="02040503050406030204" pitchFamily="18" charset="0"/>
                           <a:ea typeface="Cambria Math" panose="02040503050406030204" pitchFamily="18" charset="0"/>
                         </a:rPr>
-                        <m:t> = 0.489</m:t>
+                        <m:t> = 0.424</m:t>
                       </m:r>
                     </m:oMath>
                   </m:oMathPara>
@@ -5105,14 +4899,14 @@
             </p:nvSpPr>
             <p:spPr>
               <a:xfrm>
-                <a:off x="531569" y="4255477"/>
+                <a:off x="574448" y="1382685"/>
                 <a:ext cx="1328825" cy="369332"/>
               </a:xfrm>
               <a:prstGeom prst="rect">
                 <a:avLst/>
               </a:prstGeom>
               <a:blipFill>
-                <a:blip r:embed="rId9"/>
+                <a:blip r:embed="rId5"/>
                 <a:stretch>
                   <a:fillRect b="-16667"/>
                 </a:stretch>
@@ -5133,68 +4927,6 @@
           </p:sp>
         </mc:Fallback>
       </mc:AlternateContent>
-      <p:pic>
-        <p:nvPicPr>
-          <p:cNvPr id="26" name="Picture 25" descr="A green and black dotted diagram&#10;&#10;AI-generated content may be incorrect.">
-            <a:extLst>
-              <a:ext uri="{FF2B5EF4-FFF2-40B4-BE49-F238E27FC236}">
-                <a16:creationId xmlns:a16="http://schemas.microsoft.com/office/drawing/2014/main" id="{0CDEDC38-750F-72C9-FC42-A395A45EF0EB}"/>
-              </a:ext>
-            </a:extLst>
-          </p:cNvPr>
-          <p:cNvPicPr>
-            <a:picLocks noChangeAspect="1"/>
-          </p:cNvPicPr>
-          <p:nvPr/>
-        </p:nvPicPr>
-        <p:blipFill>
-          <a:blip r:embed="rId10"/>
-          <a:srcRect r="11263"/>
-          <a:stretch>
-            <a:fillRect/>
-          </a:stretch>
-        </p:blipFill>
-        <p:spPr>
-          <a:xfrm>
-            <a:off x="8659597" y="3720572"/>
-            <a:ext cx="3532403" cy="2898358"/>
-          </a:xfrm>
-          <a:prstGeom prst="rect">
-            <a:avLst/>
-          </a:prstGeom>
-        </p:spPr>
-      </p:pic>
-      <p:pic>
-        <p:nvPicPr>
-          <p:cNvPr id="24" name="Picture 23" descr="A green and black dotted diagram&#10;&#10;AI-generated content may be incorrect.">
-            <a:extLst>
-              <a:ext uri="{FF2B5EF4-FFF2-40B4-BE49-F238E27FC236}">
-                <a16:creationId xmlns:a16="http://schemas.microsoft.com/office/drawing/2014/main" id="{0E3035FE-29A4-EF81-9D15-04D318B8343B}"/>
-              </a:ext>
-            </a:extLst>
-          </p:cNvPr>
-          <p:cNvPicPr>
-            <a:picLocks noChangeAspect="1"/>
-          </p:cNvPicPr>
-          <p:nvPr/>
-        </p:nvPicPr>
-        <p:blipFill>
-          <a:blip r:embed="rId11"/>
-          <a:srcRect l="12687" r="11641"/>
-          <a:stretch>
-            <a:fillRect/>
-          </a:stretch>
-        </p:blipFill>
-        <p:spPr>
-          <a:xfrm>
-            <a:off x="5829033" y="3661943"/>
-            <a:ext cx="3073229" cy="2956987"/>
-          </a:xfrm>
-          <a:prstGeom prst="rect">
-            <a:avLst/>
-          </a:prstGeom>
-        </p:spPr>
-      </p:pic>
       <p:sp>
         <p:nvSpPr>
           <p:cNvPr id="30" name="TextBox 29">
@@ -5209,8 +4941,8 @@
         </p:nvSpPr>
         <p:spPr>
           <a:xfrm>
-            <a:off x="194382" y="6199141"/>
-            <a:ext cx="2311467" cy="276999"/>
+            <a:off x="237261" y="3264564"/>
+            <a:ext cx="2603213" cy="276999"/>
           </a:xfrm>
           <a:prstGeom prst="rect">
             <a:avLst/>
@@ -5225,7 +4957,15 @@
           <a:p>
             <a:r>
               <a:rPr lang="en-US" sz="1200" dirty="0"/>
-              <a:t>**target+=-log(1+exp(100*(x-2)))</a:t>
+              <a:t>**target+=-log(1+exp(100*(x-</a:t>
+            </a:r>
+            <a:r>
+              <a:rPr lang="en-US" sz="1200" dirty="0" err="1"/>
+              <a:t>Rmax</a:t>
+            </a:r>
+            <a:r>
+              <a:rPr lang="en-US" sz="1200" dirty="0"/>
+              <a:t>)))</a:t>
             </a:r>
           </a:p>
         </p:txBody>
@@ -5245,14 +4985,14 @@
           <p:nvPr/>
         </p:nvPicPr>
         <p:blipFill>
-          <a:blip r:embed="rId12"/>
+          <a:blip r:embed="rId6"/>
           <a:stretch>
             <a:fillRect/>
           </a:stretch>
         </p:blipFill>
         <p:spPr>
           <a:xfrm>
-            <a:off x="161666" y="4624809"/>
+            <a:off x="204545" y="1690232"/>
             <a:ext cx="2311468" cy="1540979"/>
           </a:xfrm>
           <a:prstGeom prst="rect">
@@ -5275,14 +5015,14 @@
           <p:nvPr/>
         </p:nvPicPr>
         <p:blipFill>
-          <a:blip r:embed="rId13"/>
+          <a:blip r:embed="rId7"/>
           <a:stretch>
             <a:fillRect/>
           </a:stretch>
         </p:blipFill>
         <p:spPr>
           <a:xfrm>
-            <a:off x="67732" y="1673130"/>
+            <a:off x="204545" y="4893734"/>
             <a:ext cx="2527361" cy="1684907"/>
           </a:xfrm>
           <a:prstGeom prst="rect">
@@ -5306,7 +5046,7 @@
             </p:nvSpPr>
             <p:spPr>
               <a:xfrm>
-                <a:off x="621484" y="1587830"/>
+                <a:off x="758297" y="4808434"/>
                 <a:ext cx="1328825" cy="369332"/>
               </a:xfrm>
               <a:prstGeom prst="rect">
@@ -5338,7 +5078,7 @@
                           <a:latin typeface="Cambria Math" panose="02040503050406030204" pitchFamily="18" charset="0"/>
                           <a:ea typeface="Cambria Math" panose="02040503050406030204" pitchFamily="18" charset="0"/>
                         </a:rPr>
-                        <m:t> = 0.273</m:t>
+                        <m:t> = 0.280</m:t>
                       </m:r>
                     </m:oMath>
                   </m:oMathPara>
@@ -5365,16 +5105,16 @@
             </p:nvSpPr>
             <p:spPr>
               <a:xfrm>
-                <a:off x="621484" y="1587830"/>
+                <a:off x="758297" y="4808434"/>
                 <a:ext cx="1328825" cy="369332"/>
               </a:xfrm>
               <a:prstGeom prst="rect">
                 <a:avLst/>
               </a:prstGeom>
               <a:blipFill>
-                <a:blip r:embed="rId14"/>
+                <a:blip r:embed="rId8"/>
                 <a:stretch>
-                  <a:fillRect b="-12903"/>
+                  <a:fillRect b="-16667"/>
                 </a:stretch>
               </a:blipFill>
             </p:spPr>
@@ -5393,149 +5133,107 @@
           </p:sp>
         </mc:Fallback>
       </mc:AlternateContent>
-      <mc:AlternateContent xmlns:mc="http://schemas.openxmlformats.org/markup-compatibility/2006">
-        <mc:Choice xmlns:a14="http://schemas.microsoft.com/office/drawing/2010/main" Requires="a14">
-          <p:sp>
-            <p:nvSpPr>
-              <p:cNvPr id="33" name="TextBox 32">
-                <a:extLst>
-                  <a:ext uri="{FF2B5EF4-FFF2-40B4-BE49-F238E27FC236}">
-                    <a16:creationId xmlns:a16="http://schemas.microsoft.com/office/drawing/2014/main" id="{D833AD36-247B-7FC9-A7E0-A1CFF8C72F88}"/>
-                  </a:ext>
-                </a:extLst>
-              </p:cNvPr>
-              <p:cNvSpPr txBox="1"/>
-              <p:nvPr/>
-            </p:nvSpPr>
-            <p:spPr>
-              <a:xfrm>
-                <a:off x="22663" y="3185354"/>
-                <a:ext cx="2689069" cy="276999"/>
-              </a:xfrm>
-              <a:prstGeom prst="rect">
-                <a:avLst/>
-              </a:prstGeom>
-              <a:noFill/>
-            </p:spPr>
-            <p:txBody>
-              <a:bodyPr wrap="none" rtlCol="0">
-                <a:spAutoFit/>
-              </a:bodyPr>
-              <a:lstStyle/>
-              <a:p>
-                <a:r>
-                  <a:rPr lang="en-US" sz="1200" dirty="0"/>
-                  <a:t>** technically </a:t>
-                </a:r>
-                <a:r>
-                  <a:rPr lang="en-US" sz="1200" dirty="0" err="1"/>
-                  <a:t>halfnormal</a:t>
-                </a:r>
-                <a:r>
-                  <a:rPr lang="en-US" sz="1200" dirty="0"/>
-                  <a:t>, as </a:t>
-                </a:r>
-                <a14:m>
-                  <m:oMath xmlns:m="http://schemas.openxmlformats.org/officeDocument/2006/math">
-                    <m:sSub>
-                      <m:sSubPr>
-                        <m:ctrlPr>
-                          <a:rPr lang="en-CA" sz="1200" i="1">
-                            <a:latin typeface="Cambria Math" panose="02040503050406030204" pitchFamily="18" charset="0"/>
-                          </a:rPr>
-                        </m:ctrlPr>
-                      </m:sSubPr>
-                      <m:e>
-                        <m:r>
-                          <m:rPr>
-                            <m:sty m:val="p"/>
-                          </m:rPr>
-                          <a:rPr lang="en-CA" sz="1200" i="1">
-                            <a:latin typeface="Cambria Math" panose="02040503050406030204" pitchFamily="18" charset="0"/>
-                          </a:rPr>
-                          <m:t>d</m:t>
-                        </m:r>
-                      </m:e>
-                      <m:sub>
-                        <m:r>
-                          <m:rPr>
-                            <m:sty m:val="p"/>
-                          </m:rPr>
-                          <a:rPr lang="en-CA" sz="1200" i="1">
-                            <a:latin typeface="Cambria Math" panose="02040503050406030204" pitchFamily="18" charset="0"/>
-                          </a:rPr>
-                          <m:t>ik</m:t>
-                        </m:r>
-                      </m:sub>
-                    </m:sSub>
-                    <m:r>
-                      <a:rPr lang="en-CA" sz="1200" b="0" i="1" smtClean="0">
-                        <a:latin typeface="Cambria Math" panose="02040503050406030204" pitchFamily="18" charset="0"/>
-                      </a:rPr>
-                      <m:t> </m:t>
-                    </m:r>
-                    <m:r>
-                      <a:rPr lang="en-CA" sz="1200" b="0" i="1" smtClean="0">
-                        <a:latin typeface="Cambria Math" panose="02040503050406030204" pitchFamily="18" charset="0"/>
-                        <a:ea typeface="Cambria Math" panose="02040503050406030204" pitchFamily="18" charset="0"/>
-                      </a:rPr>
-                      <m:t>≥ 0</m:t>
-                    </m:r>
-                  </m:oMath>
-                </a14:m>
-                <a:r>
-                  <a:rPr lang="en-US" sz="1200" dirty="0"/>
-                  <a:t> </a:t>
-                </a:r>
-              </a:p>
-            </p:txBody>
-          </p:sp>
-        </mc:Choice>
-        <mc:Fallback>
-          <p:sp>
-            <p:nvSpPr>
-              <p:cNvPr id="33" name="TextBox 32">
-                <a:extLst>
-                  <a:ext uri="{FF2B5EF4-FFF2-40B4-BE49-F238E27FC236}">
-                    <a16:creationId xmlns:a16="http://schemas.microsoft.com/office/drawing/2014/main" id="{D833AD36-247B-7FC9-A7E0-A1CFF8C72F88}"/>
-                  </a:ext>
-                </a:extLst>
-              </p:cNvPr>
-              <p:cNvSpPr txBox="1">
-                <a:spLocks noRot="1" noChangeAspect="1" noMove="1" noResize="1" noEditPoints="1" noAdjustHandles="1" noChangeArrowheads="1" noChangeShapeType="1" noTextEdit="1"/>
-              </p:cNvSpPr>
-              <p:nvPr/>
-            </p:nvSpPr>
-            <p:spPr>
-              <a:xfrm>
-                <a:off x="22663" y="3185354"/>
-                <a:ext cx="2689069" cy="276999"/>
-              </a:xfrm>
-              <a:prstGeom prst="rect">
-                <a:avLst/>
-              </a:prstGeom>
-              <a:blipFill>
-                <a:blip r:embed="rId15"/>
-                <a:stretch>
-                  <a:fillRect t="-4545" b="-13636"/>
-                </a:stretch>
-              </a:blipFill>
-            </p:spPr>
-            <p:txBody>
-              <a:bodyPr/>
-              <a:lstStyle/>
-              <a:p>
-                <a:r>
-                  <a:rPr lang="en-US">
-                    <a:noFill/>
-                  </a:rPr>
-                  <a:t> </a:t>
-                </a:r>
-              </a:p>
-            </p:txBody>
-          </p:sp>
-        </mc:Fallback>
-      </mc:AlternateContent>
+      <p:sp>
+        <p:nvSpPr>
+          <p:cNvPr id="38" name="TextBox 37">
+            <a:extLst>
+              <a:ext uri="{FF2B5EF4-FFF2-40B4-BE49-F238E27FC236}">
+                <a16:creationId xmlns:a16="http://schemas.microsoft.com/office/drawing/2014/main" id="{7543EA09-3161-E2BA-6C54-BFE1255FF2B1}"/>
+              </a:ext>
+            </a:extLst>
+          </p:cNvPr>
+          <p:cNvSpPr txBox="1"/>
+          <p:nvPr/>
+        </p:nvSpPr>
+        <p:spPr>
+          <a:xfrm>
+            <a:off x="574448" y="562904"/>
+            <a:ext cx="1087157" cy="369332"/>
+          </a:xfrm>
+          <a:prstGeom prst="rect">
+            <a:avLst/>
+          </a:prstGeom>
+          <a:noFill/>
+        </p:spPr>
+        <p:txBody>
+          <a:bodyPr wrap="none" rtlCol="0">
+            <a:spAutoFit/>
+          </a:bodyPr>
+          <a:lstStyle/>
+          <a:p>
+            <a:r>
+              <a:rPr lang="en-US" dirty="0" err="1"/>
+              <a:t>Rmax</a:t>
+            </a:r>
+            <a:r>
+              <a:rPr lang="en-US" dirty="0"/>
+              <a:t> = 2</a:t>
+            </a:r>
+          </a:p>
+        </p:txBody>
+      </p:sp>
+      <p:pic>
+        <p:nvPicPr>
+          <p:cNvPr id="40" name="Picture 39" descr="A row of green dots&#10;&#10;AI-generated content may be incorrect.">
+            <a:extLst>
+              <a:ext uri="{FF2B5EF4-FFF2-40B4-BE49-F238E27FC236}">
+                <a16:creationId xmlns:a16="http://schemas.microsoft.com/office/drawing/2014/main" id="{6CC38E14-4F9E-520C-AA4E-B40F4C769585}"/>
+              </a:ext>
+            </a:extLst>
+          </p:cNvPr>
+          <p:cNvPicPr>
+            <a:picLocks noChangeAspect="1"/>
+          </p:cNvPicPr>
+          <p:nvPr/>
+        </p:nvPicPr>
+        <p:blipFill>
+          <a:blip r:embed="rId9"/>
+          <a:srcRect t="32512" b="31081"/>
+          <a:stretch>
+            <a:fillRect/>
+          </a:stretch>
+        </p:blipFill>
+        <p:spPr>
+          <a:xfrm>
+            <a:off x="3066725" y="932236"/>
+            <a:ext cx="8888014" cy="3033584"/>
+          </a:xfrm>
+          <a:prstGeom prst="rect">
+            <a:avLst/>
+          </a:prstGeom>
+        </p:spPr>
+      </p:pic>
+      <p:pic>
+        <p:nvPicPr>
+          <p:cNvPr id="42" name="Picture 41" descr="A row of green dots&#10;&#10;AI-generated content may be incorrect.">
+            <a:extLst>
+              <a:ext uri="{FF2B5EF4-FFF2-40B4-BE49-F238E27FC236}">
+                <a16:creationId xmlns:a16="http://schemas.microsoft.com/office/drawing/2014/main" id="{7AAD5D36-1BD6-09EA-2660-F526E656E9CA}"/>
+              </a:ext>
+            </a:extLst>
+          </p:cNvPr>
+          <p:cNvPicPr>
+            <a:picLocks noChangeAspect="1"/>
+          </p:cNvPicPr>
+          <p:nvPr/>
+        </p:nvPicPr>
+        <p:blipFill>
+          <a:blip r:embed="rId10"/>
+          <a:srcRect t="31892" b="32973"/>
+          <a:stretch>
+            <a:fillRect/>
+          </a:stretch>
+        </p:blipFill>
+        <p:spPr>
+          <a:xfrm>
+            <a:off x="2905908" y="3824416"/>
+            <a:ext cx="9209648" cy="3033584"/>
+          </a:xfrm>
+          <a:prstGeom prst="rect">
+            <a:avLst/>
+          </a:prstGeom>
+        </p:spPr>
+      </p:pic>
     </p:spTree>
     <p:extLst>
       <p:ext uri="{BB962C8B-B14F-4D97-AF65-F5344CB8AC3E}">
@@ -5557,7 +5255,7 @@
         <p:cNvPr id="1" name="">
           <a:extLst>
             <a:ext uri="{FF2B5EF4-FFF2-40B4-BE49-F238E27FC236}">
-              <a16:creationId xmlns:a16="http://schemas.microsoft.com/office/drawing/2014/main" id="{73BC0CBE-6195-6DCE-FC62-6B589771EF5E}"/>
+              <a16:creationId xmlns:a16="http://schemas.microsoft.com/office/drawing/2014/main" id="{683CB806-5018-CDB3-8FCC-21B52ACC872A}"/>
             </a:ext>
           </a:extLst>
         </p:cNvPr>
@@ -5572,36 +5270,6 @@
           <a:chExt cx="0" cy="0"/>
         </a:xfrm>
       </p:grpSpPr>
-      <p:pic>
-        <p:nvPicPr>
-          <p:cNvPr id="6" name="Picture 5" descr="A green and black dotted diagram&#10;&#10;AI-generated content may be incorrect.">
-            <a:extLst>
-              <a:ext uri="{FF2B5EF4-FFF2-40B4-BE49-F238E27FC236}">
-                <a16:creationId xmlns:a16="http://schemas.microsoft.com/office/drawing/2014/main" id="{EBFE8CA0-4051-020F-EE55-66CF02621E15}"/>
-              </a:ext>
-            </a:extLst>
-          </p:cNvPr>
-          <p:cNvPicPr>
-            <a:picLocks noChangeAspect="1"/>
-          </p:cNvPicPr>
-          <p:nvPr/>
-        </p:nvPicPr>
-        <p:blipFill>
-          <a:blip r:embed="rId2"/>
-          <a:stretch>
-            <a:fillRect/>
-          </a:stretch>
-        </p:blipFill>
-        <p:spPr>
-          <a:xfrm>
-            <a:off x="2190862" y="487856"/>
-            <a:ext cx="4062794" cy="2958106"/>
-          </a:xfrm>
-          <a:prstGeom prst="rect">
-            <a:avLst/>
-          </a:prstGeom>
-        </p:spPr>
-      </p:pic>
       <mc:AlternateContent xmlns:mc="http://schemas.openxmlformats.org/markup-compatibility/2006">
         <mc:Choice xmlns:a14="http://schemas.microsoft.com/office/drawing/2010/main" Requires="a14">
           <p:sp>
@@ -5609,7 +5277,7 @@
               <p:cNvPr id="4" name="TextBox 3">
                 <a:extLst>
                   <a:ext uri="{FF2B5EF4-FFF2-40B4-BE49-F238E27FC236}">
-                    <a16:creationId xmlns:a16="http://schemas.microsoft.com/office/drawing/2014/main" id="{6EC3509A-3C1A-02C9-7DAC-F3EC1E92F774}"/>
+                    <a16:creationId xmlns:a16="http://schemas.microsoft.com/office/drawing/2014/main" id="{4A8B51F9-31BB-B49B-51FF-8E41578541D7}"/>
                   </a:ext>
                 </a:extLst>
               </p:cNvPr>
@@ -5618,8 +5286,8 @@
             </p:nvSpPr>
             <p:spPr>
               <a:xfrm>
-                <a:off x="102758" y="1166690"/>
-                <a:ext cx="2326534" cy="984885"/>
+                <a:off x="434302" y="4900117"/>
+                <a:ext cx="2007408" cy="459421"/>
               </a:xfrm>
               <a:prstGeom prst="rect">
                 <a:avLst/>
@@ -5639,88 +5307,155 @@
                       <m:jc m:val="centerGroup"/>
                     </m:oMathParaPr>
                     <m:oMath xmlns:m="http://schemas.openxmlformats.org/officeDocument/2006/math">
+                      <m:sSub>
+                        <m:sSubPr>
+                          <m:ctrlPr>
+                            <a:rPr lang="en-CA" sz="1600" b="0" i="1" smtClean="0">
+                              <a:latin typeface="Cambria Math" panose="02040503050406030204" pitchFamily="18" charset="0"/>
+                            </a:rPr>
+                          </m:ctrlPr>
+                        </m:sSubPr>
+                        <m:e>
+                          <m:r>
+                            <m:rPr>
+                              <m:sty m:val="p"/>
+                            </m:rPr>
+                            <a:rPr lang="en-CA" sz="1600" b="0" i="1" smtClean="0">
+                              <a:latin typeface="Cambria Math" panose="02040503050406030204" pitchFamily="18" charset="0"/>
+                            </a:rPr>
+                            <m:t>d</m:t>
+                          </m:r>
+                        </m:e>
+                        <m:sub>
+                          <m:r>
+                            <m:rPr>
+                              <m:sty m:val="p"/>
+                            </m:rPr>
+                            <a:rPr lang="en-CA" sz="1600" b="0" i="1" smtClean="0">
+                              <a:latin typeface="Cambria Math" panose="02040503050406030204" pitchFamily="18" charset="0"/>
+                            </a:rPr>
+                            <m:t>ik</m:t>
+                          </m:r>
+                        </m:sub>
+                      </m:sSub>
                       <m:r>
-                        <a:rPr lang="en-CA" b="0" i="1" smtClean="0">
+                        <a:rPr lang="en-CA" sz="1600" b="0" i="1" smtClean="0">
                           <a:latin typeface="Cambria Math" panose="02040503050406030204" pitchFamily="18" charset="0"/>
+                          <a:ea typeface="Cambria Math" panose="02040503050406030204" pitchFamily="18" charset="0"/>
                         </a:rPr>
-                        <m:t>𝑠𝑖𝑡𝑒</m:t>
+                        <m:t>~</m:t>
                       </m:r>
+                      <m:sSup>
+                        <m:sSupPr>
+                          <m:ctrlPr>
+                            <a:rPr lang="en-CA" sz="1600" b="0" i="1" smtClean="0">
+                              <a:latin typeface="Cambria Math" panose="02040503050406030204" pitchFamily="18" charset="0"/>
+                              <a:ea typeface="Cambria Math" panose="02040503050406030204" pitchFamily="18" charset="0"/>
+                            </a:rPr>
+                          </m:ctrlPr>
+                        </m:sSupPr>
+                        <m:e>
+                          <m:r>
+                            <m:rPr>
+                              <m:sty m:val="p"/>
+                            </m:rPr>
+                            <a:rPr lang="en-CA" sz="1600" b="0" i="1" smtClean="0">
+                              <a:latin typeface="Cambria Math" panose="02040503050406030204" pitchFamily="18" charset="0"/>
+                              <a:ea typeface="Cambria Math" panose="02040503050406030204" pitchFamily="18" charset="0"/>
+                            </a:rPr>
+                            <m:t>normal</m:t>
+                          </m:r>
+                        </m:e>
+                        <m:sup>
+                          <m:r>
+                            <a:rPr lang="en-CA" sz="1600" b="0" i="1" smtClean="0">
+                              <a:latin typeface="Cambria Math" panose="02040503050406030204" pitchFamily="18" charset="0"/>
+                              <a:ea typeface="Cambria Math" panose="02040503050406030204" pitchFamily="18" charset="0"/>
+                            </a:rPr>
+                            <m:t>+</m:t>
+                          </m:r>
+                        </m:sup>
+                      </m:sSup>
                       <m:r>
-                        <a:rPr lang="en-CA" b="0" i="1" smtClean="0">
+                        <a:rPr lang="en-CA" sz="1600" b="0" i="1" smtClean="0">
                           <a:latin typeface="Cambria Math" panose="02040503050406030204" pitchFamily="18" charset="0"/>
+                          <a:ea typeface="Cambria Math" panose="02040503050406030204" pitchFamily="18" charset="0"/>
                         </a:rPr>
-                        <m:t> </m:t>
+                        <m:t>(0, </m:t>
                       </m:r>
+                      <m:f>
+                        <m:fPr>
+                          <m:ctrlPr>
+                            <a:rPr lang="en-CA" sz="1600" b="0" i="1" smtClean="0">
+                              <a:latin typeface="Cambria Math" panose="02040503050406030204" pitchFamily="18" charset="0"/>
+                              <a:ea typeface="Cambria Math" panose="02040503050406030204" pitchFamily="18" charset="0"/>
+                            </a:rPr>
+                          </m:ctrlPr>
+                        </m:fPr>
+                        <m:num>
+                          <m:sSub>
+                            <m:sSubPr>
+                              <m:ctrlPr>
+                                <a:rPr lang="en-CA" sz="1600" b="0" i="1" smtClean="0">
+                                  <a:latin typeface="Cambria Math" panose="02040503050406030204" pitchFamily="18" charset="0"/>
+                                  <a:ea typeface="Cambria Math" panose="02040503050406030204" pitchFamily="18" charset="0"/>
+                                </a:rPr>
+                              </m:ctrlPr>
+                            </m:sSubPr>
+                            <m:e>
+                              <m:r>
+                                <m:rPr>
+                                  <m:sty m:val="p"/>
+                                </m:rPr>
+                                <a:rPr lang="en-CA" sz="1600" b="0" i="1" smtClean="0">
+                                  <a:latin typeface="Cambria Math" panose="02040503050406030204" pitchFamily="18" charset="0"/>
+                                  <a:ea typeface="Cambria Math" panose="02040503050406030204" pitchFamily="18" charset="0"/>
+                                </a:rPr>
+                                <m:t>R</m:t>
+                              </m:r>
+                            </m:e>
+                            <m:sub>
+                              <m:r>
+                                <m:rPr>
+                                  <m:sty m:val="p"/>
+                                </m:rPr>
+                                <a:rPr lang="en-CA" sz="1600" b="0" i="1" smtClean="0">
+                                  <a:latin typeface="Cambria Math" panose="02040503050406030204" pitchFamily="18" charset="0"/>
+                                  <a:ea typeface="Cambria Math" panose="02040503050406030204" pitchFamily="18" charset="0"/>
+                                </a:rPr>
+                                <m:t>max</m:t>
+                              </m:r>
+                            </m:sub>
+                          </m:sSub>
+                        </m:num>
+                        <m:den>
+                          <m:r>
+                            <a:rPr lang="en-CA" sz="1600" b="0" i="1" smtClean="0">
+                              <a:latin typeface="Cambria Math" panose="02040503050406030204" pitchFamily="18" charset="0"/>
+                              <a:ea typeface="Cambria Math" panose="02040503050406030204" pitchFamily="18" charset="0"/>
+                            </a:rPr>
+                            <m:t>2</m:t>
+                          </m:r>
+                          <m:r>
+                            <a:rPr lang="en-CA" sz="1600" b="0" i="1" smtClean="0">
+                              <a:latin typeface="Cambria Math" panose="02040503050406030204" pitchFamily="18" charset="0"/>
+                              <a:ea typeface="Cambria Math" panose="02040503050406030204" pitchFamily="18" charset="0"/>
+                            </a:rPr>
+                            <m:t>.58</m:t>
+                          </m:r>
+                        </m:den>
+                      </m:f>
                       <m:r>
-                        <a:rPr lang="en-CA" b="0" i="1" smtClean="0">
+                        <a:rPr lang="en-CA" sz="1600" b="0" i="1" smtClean="0">
                           <a:latin typeface="Cambria Math" panose="02040503050406030204" pitchFamily="18" charset="0"/>
+                          <a:ea typeface="Cambria Math" panose="02040503050406030204" pitchFamily="18" charset="0"/>
                         </a:rPr>
-                        <m:t>𝑙𝑒𝑣𝑒𝑙</m:t>
-                      </m:r>
-                      <m:r>
-                        <a:rPr lang="en-CA" b="0" i="1" smtClean="0">
-                          <a:latin typeface="Cambria Math" panose="02040503050406030204" pitchFamily="18" charset="0"/>
-                        </a:rPr>
-                        <m:t> “</m:t>
-                      </m:r>
-                      <m:r>
-                        <a:rPr lang="en-CA" b="0" i="1" smtClean="0">
-                          <a:latin typeface="Cambria Math" panose="02040503050406030204" pitchFamily="18" charset="0"/>
-                        </a:rPr>
-                        <m:t>𝑏𝑜𝑥</m:t>
-                      </m:r>
-                      <m:r>
-                        <a:rPr lang="en-CA" b="0" i="1" smtClean="0">
-                          <a:latin typeface="Cambria Math" panose="02040503050406030204" pitchFamily="18" charset="0"/>
-                        </a:rPr>
-                        <m:t>”</m:t>
+                        <m:t>)</m:t>
                       </m:r>
                     </m:oMath>
                   </m:oMathPara>
                 </a14:m>
-                <a:endParaRPr lang="en-CA" b="0" dirty="0"/>
-              </a:p>
-              <a:p>
-                <a:pPr algn="ctr"/>
-                <a:r>
-                  <a:rPr lang="en-CA" sz="1400" b="0" dirty="0"/>
-                  <a:t>e.g., </a:t>
-                </a:r>
-                <a:r>
-                  <a:rPr lang="en-CA" sz="1400" b="0" dirty="0" err="1"/>
-                  <a:t>delta_x</a:t>
-                </a:r>
-                <a:r>
-                  <a:rPr lang="en-CA" sz="1400" b="0" dirty="0"/>
-                  <a:t> uniform on </a:t>
-                </a:r>
-              </a:p>
-              <a:p>
-                <a:pPr algn="ctr"/>
-                <a:r>
-                  <a:rPr lang="en-CA" sz="1400" b="0" dirty="0"/>
-                  <a:t>[min(</a:t>
-                </a:r>
-                <a:r>
-                  <a:rPr lang="en-CA" sz="1400" b="0" dirty="0" err="1"/>
-                  <a:t>trap_x</a:t>
-                </a:r>
-                <a:r>
-                  <a:rPr lang="en-CA" sz="1400" b="0" dirty="0"/>
-                  <a:t>)-2, max(</a:t>
-                </a:r>
-                <a:r>
-                  <a:rPr lang="en-CA" sz="1400" b="0" dirty="0" err="1"/>
-                  <a:t>trap_x</a:t>
-                </a:r>
-                <a:r>
-                  <a:rPr lang="en-CA" sz="1400" b="0" dirty="0"/>
-                  <a:t>)+2]</a:t>
-                </a:r>
-              </a:p>
-              <a:p>
-                <a:pPr/>
-                <a:endParaRPr lang="en-US" dirty="0"/>
+                <a:endParaRPr lang="en-US" sz="1600" dirty="0"/>
               </a:p>
             </p:txBody>
           </p:sp>
@@ -5731,7 +5466,7 @@
               <p:cNvPr id="4" name="TextBox 3">
                 <a:extLst>
                   <a:ext uri="{FF2B5EF4-FFF2-40B4-BE49-F238E27FC236}">
-                    <a16:creationId xmlns:a16="http://schemas.microsoft.com/office/drawing/2014/main" id="{6EC3509A-3C1A-02C9-7DAC-F3EC1E92F774}"/>
+                    <a16:creationId xmlns:a16="http://schemas.microsoft.com/office/drawing/2014/main" id="{4A8B51F9-31BB-B49B-51FF-8E41578541D7}"/>
                   </a:ext>
                 </a:extLst>
               </p:cNvPr>
@@ -5742,16 +5477,16 @@
             </p:nvSpPr>
             <p:spPr>
               <a:xfrm>
-                <a:off x="102758" y="1166690"/>
-                <a:ext cx="2326534" cy="984885"/>
+                <a:off x="434302" y="4900117"/>
+                <a:ext cx="2007408" cy="459421"/>
               </a:xfrm>
               <a:prstGeom prst="rect">
                 <a:avLst/>
               </a:prstGeom>
               <a:blipFill>
-                <a:blip r:embed="rId3"/>
+                <a:blip r:embed="rId2"/>
                 <a:stretch>
-                  <a:fillRect l="-4348" t="-1266" r="-4348"/>
+                  <a:fillRect l="-2516" t="-2703" r="-3145" b="-16216"/>
                 </a:stretch>
               </a:blipFill>
             </p:spPr>
@@ -5777,7 +5512,7 @@
               <p:cNvPr id="5" name="TextBox 4">
                 <a:extLst>
                   <a:ext uri="{FF2B5EF4-FFF2-40B4-BE49-F238E27FC236}">
-                    <a16:creationId xmlns:a16="http://schemas.microsoft.com/office/drawing/2014/main" id="{9E3F4F31-5409-A4C3-C08F-FFF9F67F5F2E}"/>
+                    <a16:creationId xmlns:a16="http://schemas.microsoft.com/office/drawing/2014/main" id="{D34BC870-EC5F-812B-AD52-90EA125DCA48}"/>
                   </a:ext>
                 </a:extLst>
               </p:cNvPr>
@@ -5917,7 +5652,7 @@
               <p:cNvPr id="5" name="TextBox 4">
                 <a:extLst>
                   <a:ext uri="{FF2B5EF4-FFF2-40B4-BE49-F238E27FC236}">
-                    <a16:creationId xmlns:a16="http://schemas.microsoft.com/office/drawing/2014/main" id="{9E3F4F31-5409-A4C3-C08F-FFF9F67F5F2E}"/>
+                    <a16:creationId xmlns:a16="http://schemas.microsoft.com/office/drawing/2014/main" id="{D34BC870-EC5F-812B-AD52-90EA125DCA48}"/>
                   </a:ext>
                 </a:extLst>
               </p:cNvPr>
@@ -5935,7 +5670,7 @@
                 <a:avLst/>
               </a:prstGeom>
               <a:blipFill>
-                <a:blip r:embed="rId4"/>
+                <a:blip r:embed="rId3"/>
                 <a:stretch>
                   <a:fillRect l="-2778" t="-3846" b="-13462"/>
                 </a:stretch>
@@ -5956,111 +5691,6 @@
           </p:sp>
         </mc:Fallback>
       </mc:AlternateContent>
-      <p:sp>
-        <p:nvSpPr>
-          <p:cNvPr id="12" name="TextBox 11">
-            <a:extLst>
-              <a:ext uri="{FF2B5EF4-FFF2-40B4-BE49-F238E27FC236}">
-                <a16:creationId xmlns:a16="http://schemas.microsoft.com/office/drawing/2014/main" id="{1822B99D-2A36-74E1-14E0-7E62553D11BA}"/>
-              </a:ext>
-            </a:extLst>
-          </p:cNvPr>
-          <p:cNvSpPr txBox="1"/>
-          <p:nvPr/>
-        </p:nvSpPr>
-        <p:spPr>
-          <a:xfrm>
-            <a:off x="3710152" y="147145"/>
-            <a:ext cx="1435458" cy="369332"/>
-          </a:xfrm>
-          <a:prstGeom prst="rect">
-            <a:avLst/>
-          </a:prstGeom>
-          <a:noFill/>
-        </p:spPr>
-        <p:txBody>
-          <a:bodyPr wrap="none" rtlCol="0">
-            <a:spAutoFit/>
-          </a:bodyPr>
-          <a:lstStyle/>
-          <a:p>
-            <a:r>
-              <a:rPr lang="en-US" dirty="0"/>
-              <a:t>colony 1024 </a:t>
-            </a:r>
-          </a:p>
-        </p:txBody>
-      </p:sp>
-      <p:sp>
-        <p:nvSpPr>
-          <p:cNvPr id="13" name="TextBox 12">
-            <a:extLst>
-              <a:ext uri="{FF2B5EF4-FFF2-40B4-BE49-F238E27FC236}">
-                <a16:creationId xmlns:a16="http://schemas.microsoft.com/office/drawing/2014/main" id="{5A18415F-6308-6A2D-0A73-B9ED4C48D92D}"/>
-              </a:ext>
-            </a:extLst>
-          </p:cNvPr>
-          <p:cNvSpPr txBox="1"/>
-          <p:nvPr/>
-        </p:nvSpPr>
-        <p:spPr>
-          <a:xfrm>
-            <a:off x="6768662" y="147145"/>
-            <a:ext cx="1388970" cy="369332"/>
-          </a:xfrm>
-          <a:prstGeom prst="rect">
-            <a:avLst/>
-          </a:prstGeom>
-          <a:noFill/>
-        </p:spPr>
-        <p:txBody>
-          <a:bodyPr wrap="none" rtlCol="0">
-            <a:spAutoFit/>
-          </a:bodyPr>
-          <a:lstStyle/>
-          <a:p>
-            <a:r>
-              <a:rPr lang="en-US" dirty="0"/>
-              <a:t>colony 1373</a:t>
-            </a:r>
-          </a:p>
-        </p:txBody>
-      </p:sp>
-      <p:sp>
-        <p:nvSpPr>
-          <p:cNvPr id="14" name="TextBox 13">
-            <a:extLst>
-              <a:ext uri="{FF2B5EF4-FFF2-40B4-BE49-F238E27FC236}">
-                <a16:creationId xmlns:a16="http://schemas.microsoft.com/office/drawing/2014/main" id="{8556D550-E654-4B0E-BCC8-421092B2BCDF}"/>
-              </a:ext>
-            </a:extLst>
-          </p:cNvPr>
-          <p:cNvSpPr txBox="1"/>
-          <p:nvPr/>
-        </p:nvSpPr>
-        <p:spPr>
-          <a:xfrm>
-            <a:off x="10076825" y="147145"/>
-            <a:ext cx="1388970" cy="369332"/>
-          </a:xfrm>
-          <a:prstGeom prst="rect">
-            <a:avLst/>
-          </a:prstGeom>
-          <a:noFill/>
-        </p:spPr>
-        <p:txBody>
-          <a:bodyPr wrap="none" rtlCol="0">
-            <a:spAutoFit/>
-          </a:bodyPr>
-          <a:lstStyle/>
-          <a:p>
-            <a:r>
-              <a:rPr lang="en-US" dirty="0"/>
-              <a:t>colony 1399</a:t>
-            </a:r>
-          </a:p>
-        </p:txBody>
-      </p:sp>
       <mc:AlternateContent xmlns:mc="http://schemas.openxmlformats.org/markup-compatibility/2006">
         <mc:Choice xmlns:a14="http://schemas.microsoft.com/office/drawing/2010/main" Requires="a14">
           <p:sp>
@@ -6068,7 +5698,7 @@
               <p:cNvPr id="17" name="TextBox 16">
                 <a:extLst>
                   <a:ext uri="{FF2B5EF4-FFF2-40B4-BE49-F238E27FC236}">
-                    <a16:creationId xmlns:a16="http://schemas.microsoft.com/office/drawing/2014/main" id="{8627E9D8-5865-17EA-0E47-0010BAB2ED6E}"/>
+                    <a16:creationId xmlns:a16="http://schemas.microsoft.com/office/drawing/2014/main" id="{84444616-B4E3-528F-44A7-E204D8DF84D3}"/>
                   </a:ext>
                 </a:extLst>
               </p:cNvPr>
@@ -6077,8 +5707,8 @@
             </p:nvSpPr>
             <p:spPr>
               <a:xfrm>
-                <a:off x="576145" y="1966909"/>
-                <a:ext cx="1328825" cy="369332"/>
+                <a:off x="679850" y="5359538"/>
+                <a:ext cx="1328825" cy="646331"/>
               </a:xfrm>
               <a:prstGeom prst="rect">
                 <a:avLst/>
@@ -6090,6 +5720,63 @@
                 <a:spAutoFit/>
               </a:bodyPr>
               <a:lstStyle/>
+              <a:p>
+                <a:pPr/>
+                <a14:m>
+                  <m:oMathPara xmlns:m="http://schemas.openxmlformats.org/officeDocument/2006/math">
+                    <m:oMathParaPr>
+                      <m:jc m:val="centerGroup"/>
+                    </m:oMathParaPr>
+                    <m:oMath xmlns:m="http://schemas.openxmlformats.org/officeDocument/2006/math">
+                      <m:sSub>
+                        <m:sSubPr>
+                          <m:ctrlPr>
+                            <a:rPr lang="en-CA" i="1">
+                              <a:latin typeface="Cambria Math" panose="02040503050406030204" pitchFamily="18" charset="0"/>
+                              <a:ea typeface="Cambria Math" panose="02040503050406030204" pitchFamily="18" charset="0"/>
+                            </a:rPr>
+                          </m:ctrlPr>
+                        </m:sSubPr>
+                        <m:e>
+                          <m:r>
+                            <m:rPr>
+                              <m:sty m:val="p"/>
+                            </m:rPr>
+                            <a:rPr lang="en-CA" i="1">
+                              <a:latin typeface="Cambria Math" panose="02040503050406030204" pitchFamily="18" charset="0"/>
+                              <a:ea typeface="Cambria Math" panose="02040503050406030204" pitchFamily="18" charset="0"/>
+                            </a:rPr>
+                            <m:t>R</m:t>
+                          </m:r>
+                        </m:e>
+                        <m:sub>
+                          <m:r>
+                            <m:rPr>
+                              <m:sty m:val="p"/>
+                            </m:rPr>
+                            <a:rPr lang="en-CA" i="1">
+                              <a:latin typeface="Cambria Math" panose="02040503050406030204" pitchFamily="18" charset="0"/>
+                              <a:ea typeface="Cambria Math" panose="02040503050406030204" pitchFamily="18" charset="0"/>
+                            </a:rPr>
+                            <m:t>max</m:t>
+                          </m:r>
+                        </m:sub>
+                      </m:sSub>
+                      <m:r>
+                        <a:rPr lang="en-CA" b="0" i="1" smtClean="0">
+                          <a:latin typeface="Cambria Math" panose="02040503050406030204" pitchFamily="18" charset="0"/>
+                          <a:ea typeface="Cambria Math" panose="02040503050406030204" pitchFamily="18" charset="0"/>
+                        </a:rPr>
+                        <m:t> = 3</m:t>
+                      </m:r>
+                    </m:oMath>
+                  </m:oMathPara>
+                </a14:m>
+                <a:endParaRPr lang="en-CA" i="1" dirty="0">
+                  <a:latin typeface="Cambria Math" panose="02040503050406030204" pitchFamily="18" charset="0"/>
+                  <a:ea typeface="Cambria Math" panose="02040503050406030204" pitchFamily="18" charset="0"/>
+                </a:endParaRPr>
+              </a:p>
               <a:p>
                 <a:pPr/>
                 <a14:m>
@@ -6117,7 +5804,7 @@
                           <a:latin typeface="Cambria Math" panose="02040503050406030204" pitchFamily="18" charset="0"/>
                           <a:ea typeface="Cambria Math" panose="02040503050406030204" pitchFamily="18" charset="0"/>
                         </a:rPr>
-                        <m:t>0.956</m:t>
+                        <m:t>0.388</m:t>
                       </m:r>
                     </m:oMath>
                   </m:oMathPara>
@@ -6133,7 +5820,7 @@
               <p:cNvPr id="17" name="TextBox 16">
                 <a:extLst>
                   <a:ext uri="{FF2B5EF4-FFF2-40B4-BE49-F238E27FC236}">
-                    <a16:creationId xmlns:a16="http://schemas.microsoft.com/office/drawing/2014/main" id="{8627E9D8-5865-17EA-0E47-0010BAB2ED6E}"/>
+                    <a16:creationId xmlns:a16="http://schemas.microsoft.com/office/drawing/2014/main" id="{84444616-B4E3-528F-44A7-E204D8DF84D3}"/>
                   </a:ext>
                 </a:extLst>
               </p:cNvPr>
@@ -6144,8 +5831,243 @@
             </p:nvSpPr>
             <p:spPr>
               <a:xfrm>
-                <a:off x="576145" y="1966909"/>
-                <a:ext cx="1328825" cy="369332"/>
+                <a:off x="679850" y="5359538"/>
+                <a:ext cx="1328825" cy="646331"/>
+              </a:xfrm>
+              <a:prstGeom prst="rect">
+                <a:avLst/>
+              </a:prstGeom>
+              <a:blipFill>
+                <a:blip r:embed="rId4"/>
+                <a:stretch>
+                  <a:fillRect b="-7692"/>
+                </a:stretch>
+              </a:blipFill>
+            </p:spPr>
+            <p:txBody>
+              <a:bodyPr/>
+              <a:lstStyle/>
+              <a:p>
+                <a:r>
+                  <a:rPr lang="en-US">
+                    <a:noFill/>
+                  </a:rPr>
+                  <a:t> </a:t>
+                </a:r>
+              </a:p>
+            </p:txBody>
+          </p:sp>
+        </mc:Fallback>
+      </mc:AlternateContent>
+      <mc:AlternateContent xmlns:mc="http://schemas.openxmlformats.org/markup-compatibility/2006">
+        <mc:Choice xmlns:a14="http://schemas.microsoft.com/office/drawing/2010/main" Requires="a14">
+          <p:sp>
+            <p:nvSpPr>
+              <p:cNvPr id="2" name="TextBox 1">
+                <a:extLst>
+                  <a:ext uri="{FF2B5EF4-FFF2-40B4-BE49-F238E27FC236}">
+                    <a16:creationId xmlns:a16="http://schemas.microsoft.com/office/drawing/2014/main" id="{35E08EEE-55D2-318B-B824-FA5A4FCDE75D}"/>
+                  </a:ext>
+                </a:extLst>
+              </p:cNvPr>
+              <p:cNvSpPr txBox="1"/>
+              <p:nvPr/>
+            </p:nvSpPr>
+            <p:spPr>
+              <a:xfrm>
+                <a:off x="286021" y="1498462"/>
+                <a:ext cx="2007408" cy="459421"/>
+              </a:xfrm>
+              <a:prstGeom prst="rect">
+                <a:avLst/>
+              </a:prstGeom>
+              <a:noFill/>
+            </p:spPr>
+            <p:txBody>
+              <a:bodyPr wrap="none" lIns="0" tIns="0" rIns="0" bIns="0" rtlCol="0">
+                <a:spAutoFit/>
+              </a:bodyPr>
+              <a:lstStyle/>
+              <a:p>
+                <a:pPr/>
+                <a14:m>
+                  <m:oMathPara xmlns:m="http://schemas.openxmlformats.org/officeDocument/2006/math">
+                    <m:oMathParaPr>
+                      <m:jc m:val="centerGroup"/>
+                    </m:oMathParaPr>
+                    <m:oMath xmlns:m="http://schemas.openxmlformats.org/officeDocument/2006/math">
+                      <m:sSub>
+                        <m:sSubPr>
+                          <m:ctrlPr>
+                            <a:rPr lang="en-CA" sz="1600" b="0" i="1" smtClean="0">
+                              <a:latin typeface="Cambria Math" panose="02040503050406030204" pitchFamily="18" charset="0"/>
+                            </a:rPr>
+                          </m:ctrlPr>
+                        </m:sSubPr>
+                        <m:e>
+                          <m:r>
+                            <m:rPr>
+                              <m:sty m:val="p"/>
+                            </m:rPr>
+                            <a:rPr lang="en-CA" sz="1600" b="0" i="1" smtClean="0">
+                              <a:latin typeface="Cambria Math" panose="02040503050406030204" pitchFamily="18" charset="0"/>
+                            </a:rPr>
+                            <m:t>d</m:t>
+                          </m:r>
+                        </m:e>
+                        <m:sub>
+                          <m:r>
+                            <m:rPr>
+                              <m:sty m:val="p"/>
+                            </m:rPr>
+                            <a:rPr lang="en-CA" sz="1600" b="0" i="1" smtClean="0">
+                              <a:latin typeface="Cambria Math" panose="02040503050406030204" pitchFamily="18" charset="0"/>
+                            </a:rPr>
+                            <m:t>ik</m:t>
+                          </m:r>
+                        </m:sub>
+                      </m:sSub>
+                      <m:r>
+                        <a:rPr lang="en-CA" sz="1600" b="0" i="1" smtClean="0">
+                          <a:latin typeface="Cambria Math" panose="02040503050406030204" pitchFamily="18" charset="0"/>
+                          <a:ea typeface="Cambria Math" panose="02040503050406030204" pitchFamily="18" charset="0"/>
+                        </a:rPr>
+                        <m:t>~</m:t>
+                      </m:r>
+                      <m:sSup>
+                        <m:sSupPr>
+                          <m:ctrlPr>
+                            <a:rPr lang="en-CA" sz="1600" b="0" i="1" smtClean="0">
+                              <a:latin typeface="Cambria Math" panose="02040503050406030204" pitchFamily="18" charset="0"/>
+                              <a:ea typeface="Cambria Math" panose="02040503050406030204" pitchFamily="18" charset="0"/>
+                            </a:rPr>
+                          </m:ctrlPr>
+                        </m:sSupPr>
+                        <m:e>
+                          <m:r>
+                            <m:rPr>
+                              <m:sty m:val="p"/>
+                            </m:rPr>
+                            <a:rPr lang="en-CA" sz="1600" b="0" i="1" smtClean="0">
+                              <a:latin typeface="Cambria Math" panose="02040503050406030204" pitchFamily="18" charset="0"/>
+                              <a:ea typeface="Cambria Math" panose="02040503050406030204" pitchFamily="18" charset="0"/>
+                            </a:rPr>
+                            <m:t>normal</m:t>
+                          </m:r>
+                        </m:e>
+                        <m:sup>
+                          <m:r>
+                            <a:rPr lang="en-CA" sz="1600" b="0" i="1" smtClean="0">
+                              <a:latin typeface="Cambria Math" panose="02040503050406030204" pitchFamily="18" charset="0"/>
+                              <a:ea typeface="Cambria Math" panose="02040503050406030204" pitchFamily="18" charset="0"/>
+                            </a:rPr>
+                            <m:t>+</m:t>
+                          </m:r>
+                        </m:sup>
+                      </m:sSup>
+                      <m:r>
+                        <a:rPr lang="en-CA" sz="1600" b="0" i="1" smtClean="0">
+                          <a:latin typeface="Cambria Math" panose="02040503050406030204" pitchFamily="18" charset="0"/>
+                          <a:ea typeface="Cambria Math" panose="02040503050406030204" pitchFamily="18" charset="0"/>
+                        </a:rPr>
+                        <m:t>(0, </m:t>
+                      </m:r>
+                      <m:f>
+                        <m:fPr>
+                          <m:ctrlPr>
+                            <a:rPr lang="en-CA" sz="1600" b="0" i="1" smtClean="0">
+                              <a:latin typeface="Cambria Math" panose="02040503050406030204" pitchFamily="18" charset="0"/>
+                              <a:ea typeface="Cambria Math" panose="02040503050406030204" pitchFamily="18" charset="0"/>
+                            </a:rPr>
+                          </m:ctrlPr>
+                        </m:fPr>
+                        <m:num>
+                          <m:sSub>
+                            <m:sSubPr>
+                              <m:ctrlPr>
+                                <a:rPr lang="en-CA" sz="1600" b="0" i="1" smtClean="0">
+                                  <a:latin typeface="Cambria Math" panose="02040503050406030204" pitchFamily="18" charset="0"/>
+                                  <a:ea typeface="Cambria Math" panose="02040503050406030204" pitchFamily="18" charset="0"/>
+                                </a:rPr>
+                              </m:ctrlPr>
+                            </m:sSubPr>
+                            <m:e>
+                              <m:r>
+                                <m:rPr>
+                                  <m:sty m:val="p"/>
+                                </m:rPr>
+                                <a:rPr lang="en-CA" sz="1600" b="0" i="1" smtClean="0">
+                                  <a:latin typeface="Cambria Math" panose="02040503050406030204" pitchFamily="18" charset="0"/>
+                                  <a:ea typeface="Cambria Math" panose="02040503050406030204" pitchFamily="18" charset="0"/>
+                                </a:rPr>
+                                <m:t>R</m:t>
+                              </m:r>
+                            </m:e>
+                            <m:sub>
+                              <m:r>
+                                <m:rPr>
+                                  <m:sty m:val="p"/>
+                                </m:rPr>
+                                <a:rPr lang="en-CA" sz="1600" b="0" i="1" smtClean="0">
+                                  <a:latin typeface="Cambria Math" panose="02040503050406030204" pitchFamily="18" charset="0"/>
+                                  <a:ea typeface="Cambria Math" panose="02040503050406030204" pitchFamily="18" charset="0"/>
+                                </a:rPr>
+                                <m:t>max</m:t>
+                              </m:r>
+                            </m:sub>
+                          </m:sSub>
+                        </m:num>
+                        <m:den>
+                          <m:r>
+                            <a:rPr lang="en-CA" sz="1600" b="0" i="1" smtClean="0">
+                              <a:latin typeface="Cambria Math" panose="02040503050406030204" pitchFamily="18" charset="0"/>
+                              <a:ea typeface="Cambria Math" panose="02040503050406030204" pitchFamily="18" charset="0"/>
+                            </a:rPr>
+                            <m:t>2</m:t>
+                          </m:r>
+                          <m:r>
+                            <a:rPr lang="en-CA" sz="1600" b="0" i="1" smtClean="0">
+                              <a:latin typeface="Cambria Math" panose="02040503050406030204" pitchFamily="18" charset="0"/>
+                              <a:ea typeface="Cambria Math" panose="02040503050406030204" pitchFamily="18" charset="0"/>
+                            </a:rPr>
+                            <m:t>.58</m:t>
+                          </m:r>
+                        </m:den>
+                      </m:f>
+                      <m:r>
+                        <a:rPr lang="en-CA" sz="1600" b="0" i="1" smtClean="0">
+                          <a:latin typeface="Cambria Math" panose="02040503050406030204" pitchFamily="18" charset="0"/>
+                          <a:ea typeface="Cambria Math" panose="02040503050406030204" pitchFamily="18" charset="0"/>
+                        </a:rPr>
+                        <m:t>)</m:t>
+                      </m:r>
+                    </m:oMath>
+                  </m:oMathPara>
+                </a14:m>
+                <a:endParaRPr lang="en-US" sz="1600" dirty="0"/>
+              </a:p>
+            </p:txBody>
+          </p:sp>
+        </mc:Choice>
+        <mc:Fallback>
+          <p:sp>
+            <p:nvSpPr>
+              <p:cNvPr id="2" name="TextBox 1">
+                <a:extLst>
+                  <a:ext uri="{FF2B5EF4-FFF2-40B4-BE49-F238E27FC236}">
+                    <a16:creationId xmlns:a16="http://schemas.microsoft.com/office/drawing/2014/main" id="{35E08EEE-55D2-318B-B824-FA5A4FCDE75D}"/>
+                  </a:ext>
+                </a:extLst>
+              </p:cNvPr>
+              <p:cNvSpPr txBox="1">
+                <a:spLocks noRot="1" noChangeAspect="1" noMove="1" noResize="1" noEditPoints="1" noAdjustHandles="1" noChangeArrowheads="1" noChangeShapeType="1" noTextEdit="1"/>
+              </p:cNvSpPr>
+              <p:nvPr/>
+            </p:nvSpPr>
+            <p:spPr>
+              <a:xfrm>
+                <a:off x="286021" y="1498462"/>
+                <a:ext cx="2007408" cy="459421"/>
               </a:xfrm>
               <a:prstGeom prst="rect">
                 <a:avLst/>
@@ -6153,7 +6075,175 @@
               <a:blipFill>
                 <a:blip r:embed="rId5"/>
                 <a:stretch>
-                  <a:fillRect b="-17241"/>
+                  <a:fillRect l="-1887" t="-2703" r="-3145" b="-13514"/>
+                </a:stretch>
+              </a:blipFill>
+            </p:spPr>
+            <p:txBody>
+              <a:bodyPr/>
+              <a:lstStyle/>
+              <a:p>
+                <a:r>
+                  <a:rPr lang="en-US">
+                    <a:noFill/>
+                  </a:rPr>
+                  <a:t> </a:t>
+                </a:r>
+              </a:p>
+            </p:txBody>
+          </p:sp>
+        </mc:Fallback>
+      </mc:AlternateContent>
+      <mc:AlternateContent xmlns:mc="http://schemas.openxmlformats.org/markup-compatibility/2006">
+        <mc:Choice xmlns:a14="http://schemas.microsoft.com/office/drawing/2010/main" Requires="a14">
+          <p:sp>
+            <p:nvSpPr>
+              <p:cNvPr id="3" name="TextBox 2">
+                <a:extLst>
+                  <a:ext uri="{FF2B5EF4-FFF2-40B4-BE49-F238E27FC236}">
+                    <a16:creationId xmlns:a16="http://schemas.microsoft.com/office/drawing/2014/main" id="{0000832B-BE9C-6049-44BF-EBCEA3E0755C}"/>
+                  </a:ext>
+                </a:extLst>
+              </p:cNvPr>
+              <p:cNvSpPr txBox="1"/>
+              <p:nvPr/>
+            </p:nvSpPr>
+            <p:spPr>
+              <a:xfrm>
+                <a:off x="625312" y="1957883"/>
+                <a:ext cx="1367297" cy="646331"/>
+              </a:xfrm>
+              <a:prstGeom prst="rect">
+                <a:avLst/>
+              </a:prstGeom>
+              <a:noFill/>
+            </p:spPr>
+            <p:txBody>
+              <a:bodyPr wrap="none" rtlCol="0">
+                <a:spAutoFit/>
+              </a:bodyPr>
+              <a:lstStyle/>
+              <a:p>
+                <a:pPr/>
+                <a14:m>
+                  <m:oMathPara xmlns:m="http://schemas.openxmlformats.org/officeDocument/2006/math">
+                    <m:oMathParaPr>
+                      <m:jc m:val="centerGroup"/>
+                    </m:oMathParaPr>
+                    <m:oMath xmlns:m="http://schemas.openxmlformats.org/officeDocument/2006/math">
+                      <m:sSub>
+                        <m:sSubPr>
+                          <m:ctrlPr>
+                            <a:rPr lang="en-CA" i="1">
+                              <a:latin typeface="Cambria Math" panose="02040503050406030204" pitchFamily="18" charset="0"/>
+                              <a:ea typeface="Cambria Math" panose="02040503050406030204" pitchFamily="18" charset="0"/>
+                            </a:rPr>
+                          </m:ctrlPr>
+                        </m:sSubPr>
+                        <m:e>
+                          <m:r>
+                            <m:rPr>
+                              <m:sty m:val="p"/>
+                            </m:rPr>
+                            <a:rPr lang="en-CA" i="1">
+                              <a:latin typeface="Cambria Math" panose="02040503050406030204" pitchFamily="18" charset="0"/>
+                              <a:ea typeface="Cambria Math" panose="02040503050406030204" pitchFamily="18" charset="0"/>
+                            </a:rPr>
+                            <m:t>R</m:t>
+                          </m:r>
+                        </m:e>
+                        <m:sub>
+                          <m:r>
+                            <m:rPr>
+                              <m:sty m:val="p"/>
+                            </m:rPr>
+                            <a:rPr lang="en-CA" i="1">
+                              <a:latin typeface="Cambria Math" panose="02040503050406030204" pitchFamily="18" charset="0"/>
+                              <a:ea typeface="Cambria Math" panose="02040503050406030204" pitchFamily="18" charset="0"/>
+                            </a:rPr>
+                            <m:t>max</m:t>
+                          </m:r>
+                        </m:sub>
+                      </m:sSub>
+                      <m:r>
+                        <a:rPr lang="en-CA" b="0" i="1" smtClean="0">
+                          <a:latin typeface="Cambria Math" panose="02040503050406030204" pitchFamily="18" charset="0"/>
+                          <a:ea typeface="Cambria Math" panose="02040503050406030204" pitchFamily="18" charset="0"/>
+                        </a:rPr>
+                        <m:t> = 1</m:t>
+                      </m:r>
+                    </m:oMath>
+                  </m:oMathPara>
+                </a14:m>
+                <a:endParaRPr lang="en-CA" i="1" dirty="0">
+                  <a:latin typeface="Cambria Math" panose="02040503050406030204" pitchFamily="18" charset="0"/>
+                  <a:ea typeface="Cambria Math" panose="02040503050406030204" pitchFamily="18" charset="0"/>
+                </a:endParaRPr>
+              </a:p>
+              <a:p>
+                <a:pPr/>
+                <a14:m>
+                  <m:oMathPara xmlns:m="http://schemas.openxmlformats.org/officeDocument/2006/math">
+                    <m:oMathParaPr>
+                      <m:jc m:val="centerGroup"/>
+                    </m:oMathParaPr>
+                    <m:oMath xmlns:m="http://schemas.openxmlformats.org/officeDocument/2006/math">
+                      <m:r>
+                        <a:rPr lang="en-US" i="1" smtClean="0">
+                          <a:latin typeface="Cambria Math" panose="02040503050406030204" pitchFamily="18" charset="0"/>
+                          <a:ea typeface="Cambria Math" panose="02040503050406030204" pitchFamily="18" charset="0"/>
+                        </a:rPr>
+                        <m:t>𝜌</m:t>
+                      </m:r>
+                      <m:r>
+                        <a:rPr lang="en-CA" b="0" i="1" smtClean="0">
+                          <a:latin typeface="Cambria Math" panose="02040503050406030204" pitchFamily="18" charset="0"/>
+                          <a:ea typeface="Cambria Math" panose="02040503050406030204" pitchFamily="18" charset="0"/>
+                        </a:rPr>
+                        <m:t> = 0.</m:t>
+                      </m:r>
+                      <m:r>
+                        <a:rPr lang="en-CA" b="0" i="1" smtClean="0">
+                          <a:latin typeface="Cambria Math" panose="02040503050406030204" pitchFamily="18" charset="0"/>
+                          <a:ea typeface="Cambria Math" panose="02040503050406030204" pitchFamily="18" charset="0"/>
+                        </a:rPr>
+                        <m:t> 166</m:t>
+                      </m:r>
+                    </m:oMath>
+                  </m:oMathPara>
+                </a14:m>
+                <a:endParaRPr lang="en-US" dirty="0"/>
+              </a:p>
+            </p:txBody>
+          </p:sp>
+        </mc:Choice>
+        <mc:Fallback>
+          <p:sp>
+            <p:nvSpPr>
+              <p:cNvPr id="3" name="TextBox 2">
+                <a:extLst>
+                  <a:ext uri="{FF2B5EF4-FFF2-40B4-BE49-F238E27FC236}">
+                    <a16:creationId xmlns:a16="http://schemas.microsoft.com/office/drawing/2014/main" id="{0000832B-BE9C-6049-44BF-EBCEA3E0755C}"/>
+                  </a:ext>
+                </a:extLst>
+              </p:cNvPr>
+              <p:cNvSpPr txBox="1">
+                <a:spLocks noRot="1" noChangeAspect="1" noMove="1" noResize="1" noEditPoints="1" noAdjustHandles="1" noChangeArrowheads="1" noChangeShapeType="1" noTextEdit="1"/>
+              </p:cNvSpPr>
+              <p:nvPr/>
+            </p:nvSpPr>
+            <p:spPr>
+              <a:xfrm>
+                <a:off x="625312" y="1957883"/>
+                <a:ext cx="1367297" cy="646331"/>
+              </a:xfrm>
+              <a:prstGeom prst="rect">
+                <a:avLst/>
+              </a:prstGeom>
+              <a:blipFill>
+                <a:blip r:embed="rId6"/>
+                <a:stretch>
+                  <a:fillRect b="-7843"/>
                 </a:stretch>
               </a:blipFill>
             </p:spPr>
@@ -6174,41 +6264,10 @@
       </mc:AlternateContent>
       <p:pic>
         <p:nvPicPr>
-          <p:cNvPr id="19" name="Picture 18" descr="A green and black dotted map&#10;&#10;AI-generated content may be incorrect.">
+          <p:cNvPr id="7" name="Picture 6" descr="A row of graphs showing a number of data&#10;&#10;AI-generated content may be incorrect.">
             <a:extLst>
               <a:ext uri="{FF2B5EF4-FFF2-40B4-BE49-F238E27FC236}">
-                <a16:creationId xmlns:a16="http://schemas.microsoft.com/office/drawing/2014/main" id="{1D9B2C44-C07F-6971-88D7-26A81A1AC5A9}"/>
-              </a:ext>
-            </a:extLst>
-          </p:cNvPr>
-          <p:cNvPicPr>
-            <a:picLocks noChangeAspect="1"/>
-          </p:cNvPicPr>
-          <p:nvPr/>
-        </p:nvPicPr>
-        <p:blipFill>
-          <a:blip r:embed="rId6"/>
-          <a:srcRect r="10339"/>
-          <a:stretch>
-            <a:fillRect/>
-          </a:stretch>
-        </p:blipFill>
-        <p:spPr>
-          <a:xfrm>
-            <a:off x="8549262" y="477347"/>
-            <a:ext cx="3642738" cy="2958106"/>
-          </a:xfrm>
-          <a:prstGeom prst="rect">
-            <a:avLst/>
-          </a:prstGeom>
-        </p:spPr>
-      </p:pic>
-      <p:pic>
-        <p:nvPicPr>
-          <p:cNvPr id="10" name="Picture 9" descr="A green and black dotted diagram&#10;&#10;AI-generated content may be incorrect.">
-            <a:extLst>
-              <a:ext uri="{FF2B5EF4-FFF2-40B4-BE49-F238E27FC236}">
-                <a16:creationId xmlns:a16="http://schemas.microsoft.com/office/drawing/2014/main" id="{BD13D114-3528-DA2A-6173-166D60A5DFC5}"/>
+                <a16:creationId xmlns:a16="http://schemas.microsoft.com/office/drawing/2014/main" id="{D374E0DD-0DBE-8119-9C43-D3FB4C6B78D9}"/>
               </a:ext>
             </a:extLst>
           </p:cNvPr>
@@ -6219,15 +6278,46 @@
         </p:nvPicPr>
         <p:blipFill>
           <a:blip r:embed="rId7"/>
-          <a:srcRect l="12600" r="11685"/>
+          <a:srcRect t="31553" b="32862"/>
           <a:stretch>
             <a:fillRect/>
           </a:stretch>
         </p:blipFill>
         <p:spPr>
           <a:xfrm>
-            <a:off x="5885793" y="487856"/>
-            <a:ext cx="3058510" cy="2941144"/>
+            <a:off x="2632720" y="397842"/>
+            <a:ext cx="9352346" cy="3120081"/>
+          </a:xfrm>
+          <a:prstGeom prst="rect">
+            <a:avLst/>
+          </a:prstGeom>
+        </p:spPr>
+      </p:pic>
+      <p:pic>
+        <p:nvPicPr>
+          <p:cNvPr id="9" name="Picture 8" descr="A row of green dots&#10;&#10;AI-generated content may be incorrect.">
+            <a:extLst>
+              <a:ext uri="{FF2B5EF4-FFF2-40B4-BE49-F238E27FC236}">
+                <a16:creationId xmlns:a16="http://schemas.microsoft.com/office/drawing/2014/main" id="{839BAC2E-2AFE-6190-8CF3-577A98CE21A8}"/>
+              </a:ext>
+            </a:extLst>
+          </p:cNvPr>
+          <p:cNvPicPr>
+            <a:picLocks noChangeAspect="1"/>
+          </p:cNvPicPr>
+          <p:nvPr/>
+        </p:nvPicPr>
+        <p:blipFill>
+          <a:blip r:embed="rId8"/>
+          <a:srcRect t="32072" b="32793"/>
+          <a:stretch>
+            <a:fillRect/>
+          </a:stretch>
+        </p:blipFill>
+        <p:spPr>
+          <a:xfrm>
+            <a:off x="2632720" y="3799498"/>
+            <a:ext cx="9472245" cy="3120080"/>
           </a:xfrm>
           <a:prstGeom prst="rect">
             <a:avLst/>
@@ -6237,7 +6327,7 @@
     </p:spTree>
     <p:extLst>
       <p:ext uri="{BB962C8B-B14F-4D97-AF65-F5344CB8AC3E}">
-        <p14:creationId xmlns:p14="http://schemas.microsoft.com/office/powerpoint/2010/main" val="2808949373"/>
+        <p14:creationId xmlns:p14="http://schemas.microsoft.com/office/powerpoint/2010/main" val="717548117"/>
       </p:ext>
     </p:extLst>
   </p:cSld>

</xml_diff>

<commit_message>
files to compute composition
</commit_message>
<xml_diff>
--- a/docs/bounding_colony_locations.pptx
+++ b/docs/bounding_colony_locations.pptx
@@ -9,10 +9,12 @@
     <p:sldId id="257" r:id="rId3"/>
     <p:sldId id="266" r:id="rId4"/>
     <p:sldId id="258" r:id="rId5"/>
-    <p:sldId id="260" r:id="rId6"/>
-    <p:sldId id="262" r:id="rId7"/>
-    <p:sldId id="261" r:id="rId8"/>
-    <p:sldId id="263" r:id="rId9"/>
+    <p:sldId id="268" r:id="rId6"/>
+    <p:sldId id="263" r:id="rId7"/>
+    <p:sldId id="267" r:id="rId8"/>
+    <p:sldId id="260" r:id="rId9"/>
+    <p:sldId id="262" r:id="rId10"/>
+    <p:sldId id="261" r:id="rId11"/>
   </p:sldIdLst>
   <p:sldSz cx="12192000" cy="6858000"/>
   <p:notesSz cx="6858000" cy="9144000"/>
@@ -111,6 +113,11 @@
       </a:defRPr>
     </a:lvl9pPr>
   </p:defaultTextStyle>
+  <p:extLst>
+    <p:ext uri="{EFAFB233-063F-42B5-8137-9DF3F51BA10A}">
+      <p15:sldGuideLst xmlns:p15="http://schemas.microsoft.com/office/powerpoint/2012/main"/>
+    </p:ext>
+  </p:extLst>
 </p:presentation>
 </file>
 
@@ -261,7 +268,7 @@
           <a:p>
             <a:fld id="{B8F82DB1-D9D0-3542-AF12-03547E78E5C6}" type="datetimeFigureOut">
               <a:rPr lang="en-US" smtClean="0"/>
-              <a:t>1/14/26</a:t>
+              <a:t>2/5/26</a:t>
             </a:fld>
             <a:endParaRPr lang="en-US"/>
           </a:p>
@@ -459,7 +466,7 @@
           <a:p>
             <a:fld id="{B8F82DB1-D9D0-3542-AF12-03547E78E5C6}" type="datetimeFigureOut">
               <a:rPr lang="en-US" smtClean="0"/>
-              <a:t>1/14/26</a:t>
+              <a:t>2/5/26</a:t>
             </a:fld>
             <a:endParaRPr lang="en-US"/>
           </a:p>
@@ -667,7 +674,7 @@
           <a:p>
             <a:fld id="{B8F82DB1-D9D0-3542-AF12-03547E78E5C6}" type="datetimeFigureOut">
               <a:rPr lang="en-US" smtClean="0"/>
-              <a:t>1/14/26</a:t>
+              <a:t>2/5/26</a:t>
             </a:fld>
             <a:endParaRPr lang="en-US"/>
           </a:p>
@@ -865,7 +872,7 @@
           <a:p>
             <a:fld id="{B8F82DB1-D9D0-3542-AF12-03547E78E5C6}" type="datetimeFigureOut">
               <a:rPr lang="en-US" smtClean="0"/>
-              <a:t>1/14/26</a:t>
+              <a:t>2/5/26</a:t>
             </a:fld>
             <a:endParaRPr lang="en-US"/>
           </a:p>
@@ -1140,7 +1147,7 @@
           <a:p>
             <a:fld id="{B8F82DB1-D9D0-3542-AF12-03547E78E5C6}" type="datetimeFigureOut">
               <a:rPr lang="en-US" smtClean="0"/>
-              <a:t>1/14/26</a:t>
+              <a:t>2/5/26</a:t>
             </a:fld>
             <a:endParaRPr lang="en-US"/>
           </a:p>
@@ -1405,7 +1412,7 @@
           <a:p>
             <a:fld id="{B8F82DB1-D9D0-3542-AF12-03547E78E5C6}" type="datetimeFigureOut">
               <a:rPr lang="en-US" smtClean="0"/>
-              <a:t>1/14/26</a:t>
+              <a:t>2/5/26</a:t>
             </a:fld>
             <a:endParaRPr lang="en-US"/>
           </a:p>
@@ -1817,7 +1824,7 @@
           <a:p>
             <a:fld id="{B8F82DB1-D9D0-3542-AF12-03547E78E5C6}" type="datetimeFigureOut">
               <a:rPr lang="en-US" smtClean="0"/>
-              <a:t>1/14/26</a:t>
+              <a:t>2/5/26</a:t>
             </a:fld>
             <a:endParaRPr lang="en-US"/>
           </a:p>
@@ -1958,7 +1965,7 @@
           <a:p>
             <a:fld id="{B8F82DB1-D9D0-3542-AF12-03547E78E5C6}" type="datetimeFigureOut">
               <a:rPr lang="en-US" smtClean="0"/>
-              <a:t>1/14/26</a:t>
+              <a:t>2/5/26</a:t>
             </a:fld>
             <a:endParaRPr lang="en-US"/>
           </a:p>
@@ -2071,7 +2078,7 @@
           <a:p>
             <a:fld id="{B8F82DB1-D9D0-3542-AF12-03547E78E5C6}" type="datetimeFigureOut">
               <a:rPr lang="en-US" smtClean="0"/>
-              <a:t>1/14/26</a:t>
+              <a:t>2/5/26</a:t>
             </a:fld>
             <a:endParaRPr lang="en-US"/>
           </a:p>
@@ -2382,7 +2389,7 @@
           <a:p>
             <a:fld id="{B8F82DB1-D9D0-3542-AF12-03547E78E5C6}" type="datetimeFigureOut">
               <a:rPr lang="en-US" smtClean="0"/>
-              <a:t>1/14/26</a:t>
+              <a:t>2/5/26</a:t>
             </a:fld>
             <a:endParaRPr lang="en-US"/>
           </a:p>
@@ -2670,7 +2677,7 @@
           <a:p>
             <a:fld id="{B8F82DB1-D9D0-3542-AF12-03547E78E5C6}" type="datetimeFigureOut">
               <a:rPr lang="en-US" smtClean="0"/>
-              <a:t>1/14/26</a:t>
+              <a:t>2/5/26</a:t>
             </a:fld>
             <a:endParaRPr lang="en-US"/>
           </a:p>
@@ -2911,7 +2918,7 @@
           <a:p>
             <a:fld id="{B8F82DB1-D9D0-3542-AF12-03547E78E5C6}" type="datetimeFigureOut">
               <a:rPr lang="en-US" smtClean="0"/>
-              <a:t>1/14/26</a:t>
+              <a:t>2/5/26</a:t>
             </a:fld>
             <a:endParaRPr lang="en-US"/>
           </a:p>
@@ -3328,8 +3335,8 @@
           <a:chExt cx="0" cy="0"/>
         </a:xfrm>
       </p:grpSpPr>
-      <mc:AlternateContent xmlns:mc="http://schemas.openxmlformats.org/markup-compatibility/2006">
-        <mc:Choice xmlns:a14="http://schemas.microsoft.com/office/drawing/2010/main" Requires="a14">
+      <mc:AlternateContent xmlns:mc="http://schemas.openxmlformats.org/markup-compatibility/2006" xmlns:a14="http://schemas.microsoft.com/office/drawing/2010/main">
+        <mc:Choice Requires="a14">
           <p:sp>
             <p:nvSpPr>
               <p:cNvPr id="4" name="TextBox 3">
@@ -3358,6 +3365,7 @@
               </a:bodyPr>
               <a:lstStyle/>
               <a:p>
+                <a:pPr/>
                 <a14:m>
                   <m:oMathPara xmlns:m="http://schemas.openxmlformats.org/officeDocument/2006/math">
                     <m:oMathParaPr>
@@ -3409,7 +3417,7 @@
                         <a:rPr lang="en-CA" b="0" i="1" smtClean="0">
                           <a:latin typeface="Cambria Math" panose="02040503050406030204" pitchFamily="18" charset="0"/>
                         </a:rPr>
-                        <m:t>) = -</m:t>
+                        <m:t>) = −</m:t>
                       </m:r>
                       <m:f>
                         <m:fPr>
@@ -3526,7 +3534,7 @@
             </p:txBody>
           </p:sp>
         </mc:Choice>
-        <mc:Fallback>
+        <mc:Fallback xmlns="">
           <p:sp>
             <p:nvSpPr>
               <p:cNvPr id="4" name="TextBox 3">
@@ -3571,8 +3579,8 @@
           </p:sp>
         </mc:Fallback>
       </mc:AlternateContent>
-      <mc:AlternateContent xmlns:mc="http://schemas.openxmlformats.org/markup-compatibility/2006">
-        <mc:Choice xmlns:a14="http://schemas.microsoft.com/office/drawing/2010/main" Requires="a14">
+      <mc:AlternateContent xmlns:mc="http://schemas.openxmlformats.org/markup-compatibility/2006" xmlns:a14="http://schemas.microsoft.com/office/drawing/2010/main">
+        <mc:Choice Requires="a14">
           <p:sp>
             <p:nvSpPr>
               <p:cNvPr id="7" name="TextBox 6">
@@ -3601,6 +3609,7 @@
               </a:bodyPr>
               <a:lstStyle/>
               <a:p>
+                <a:pPr/>
                 <a14:m>
                   <m:oMathPara xmlns:m="http://schemas.openxmlformats.org/officeDocument/2006/math">
                     <m:oMathParaPr>
@@ -3663,7 +3672,7 @@
             </p:txBody>
           </p:sp>
         </mc:Choice>
-        <mc:Fallback>
+        <mc:Fallback xmlns="">
           <p:sp>
             <p:nvSpPr>
               <p:cNvPr id="7" name="TextBox 6">
@@ -3708,8 +3717,8 @@
           </p:sp>
         </mc:Fallback>
       </mc:AlternateContent>
-      <mc:AlternateContent xmlns:mc="http://schemas.openxmlformats.org/markup-compatibility/2006">
-        <mc:Choice xmlns:a14="http://schemas.microsoft.com/office/drawing/2010/main" Requires="a14">
+      <mc:AlternateContent xmlns:mc="http://schemas.openxmlformats.org/markup-compatibility/2006" xmlns:a14="http://schemas.microsoft.com/office/drawing/2010/main">
+        <mc:Choice Requires="a14">
           <p:sp>
             <p:nvSpPr>
               <p:cNvPr id="8" name="TextBox 7">
@@ -3738,6 +3747,7 @@
               </a:bodyPr>
               <a:lstStyle/>
               <a:p>
+                <a:pPr/>
                 <a14:m>
                   <m:oMathPara xmlns:m="http://schemas.openxmlformats.org/officeDocument/2006/math">
                     <m:oMathParaPr>
@@ -3884,7 +3894,7 @@
             </p:txBody>
           </p:sp>
         </mc:Choice>
-        <mc:Fallback>
+        <mc:Fallback xmlns="">
           <p:sp>
             <p:nvSpPr>
               <p:cNvPr id="8" name="TextBox 7">
@@ -3929,8 +3939,8 @@
           </p:sp>
         </mc:Fallback>
       </mc:AlternateContent>
-      <mc:AlternateContent xmlns:mc="http://schemas.openxmlformats.org/markup-compatibility/2006">
-        <mc:Choice xmlns:a14="http://schemas.microsoft.com/office/drawing/2010/main" Requires="a14">
+      <mc:AlternateContent xmlns:mc="http://schemas.openxmlformats.org/markup-compatibility/2006" xmlns:a14="http://schemas.microsoft.com/office/drawing/2010/main">
+        <mc:Choice Requires="a14">
           <p:sp>
             <p:nvSpPr>
               <p:cNvPr id="10" name="TextBox 9">
@@ -3959,6 +3969,7 @@
               </a:bodyPr>
               <a:lstStyle/>
               <a:p>
+                <a:pPr/>
                 <a14:m>
                   <m:oMathPara xmlns:m="http://schemas.openxmlformats.org/officeDocument/2006/math">
                     <m:oMathParaPr>
@@ -4151,7 +4162,7 @@
             </p:txBody>
           </p:sp>
         </mc:Choice>
-        <mc:Fallback>
+        <mc:Fallback xmlns="">
           <p:sp>
             <p:nvSpPr>
               <p:cNvPr id="10" name="TextBox 9">
@@ -4209,6 +4220,68 @@
 </p:sld>
 </file>
 
+<file path=ppt/slides/slide10.xml><?xml version="1.0" encoding="utf-8"?>
+<p:sld xmlns:a="http://schemas.openxmlformats.org/drawingml/2006/main" xmlns:r="http://schemas.openxmlformats.org/officeDocument/2006/relationships" xmlns:p="http://schemas.openxmlformats.org/presentationml/2006/main">
+  <p:cSld>
+    <p:spTree>
+      <p:nvGrpSpPr>
+        <p:cNvPr id="1" name=""/>
+        <p:cNvGrpSpPr/>
+        <p:nvPr/>
+      </p:nvGrpSpPr>
+      <p:grpSpPr>
+        <a:xfrm>
+          <a:off x="0" y="0"/>
+          <a:ext cx="0" cy="0"/>
+          <a:chOff x="0" y="0"/>
+          <a:chExt cx="0" cy="0"/>
+        </a:xfrm>
+      </p:grpSpPr>
+      <p:pic>
+        <p:nvPicPr>
+          <p:cNvPr id="4" name="Picture 3">
+            <a:extLst>
+              <a:ext uri="{FF2B5EF4-FFF2-40B4-BE49-F238E27FC236}">
+                <a16:creationId xmlns:a16="http://schemas.microsoft.com/office/drawing/2014/main" id="{8043A77D-44DF-C705-75F0-02B6AC097D02}"/>
+              </a:ext>
+            </a:extLst>
+          </p:cNvPr>
+          <p:cNvPicPr>
+            <a:picLocks noChangeAspect="1"/>
+          </p:cNvPicPr>
+          <p:nvPr/>
+        </p:nvPicPr>
+        <p:blipFill>
+          <a:blip r:embed="rId2">
+            <a:alphaModFix/>
+          </a:blip>
+          <a:stretch>
+            <a:fillRect/>
+          </a:stretch>
+        </p:blipFill>
+        <p:spPr>
+          <a:xfrm>
+            <a:off x="-704335" y="0"/>
+            <a:ext cx="14111416" cy="6450227"/>
+          </a:xfrm>
+          <a:prstGeom prst="rect">
+            <a:avLst/>
+          </a:prstGeom>
+        </p:spPr>
+      </p:pic>
+    </p:spTree>
+    <p:extLst>
+      <p:ext uri="{BB962C8B-B14F-4D97-AF65-F5344CB8AC3E}">
+        <p14:creationId xmlns:p14="http://schemas.microsoft.com/office/powerpoint/2010/main" val="3884319733"/>
+      </p:ext>
+    </p:extLst>
+  </p:cSld>
+  <p:clrMapOvr>
+    <a:masterClrMapping/>
+  </p:clrMapOvr>
+</p:sld>
+</file>
+
 <file path=ppt/slides/slide2.xml><?xml version="1.0" encoding="utf-8"?>
 <p:sld xmlns:a="http://schemas.openxmlformats.org/drawingml/2006/main" xmlns:r="http://schemas.openxmlformats.org/officeDocument/2006/relationships" xmlns:p="http://schemas.openxmlformats.org/presentationml/2006/main">
   <p:cSld>
@@ -4226,8 +4299,8 @@
           <a:chExt cx="0" cy="0"/>
         </a:xfrm>
       </p:grpSpPr>
-      <mc:AlternateContent xmlns:mc="http://schemas.openxmlformats.org/markup-compatibility/2006">
-        <mc:Choice xmlns:a14="http://schemas.microsoft.com/office/drawing/2010/main" Requires="a14">
+      <mc:AlternateContent xmlns:mc="http://schemas.openxmlformats.org/markup-compatibility/2006" xmlns:a14="http://schemas.microsoft.com/office/drawing/2010/main">
+        <mc:Choice Requires="a14">
           <p:sp>
             <p:nvSpPr>
               <p:cNvPr id="4" name="TextBox 3">
@@ -4256,6 +4329,7 @@
               </a:bodyPr>
               <a:lstStyle/>
               <a:p>
+                <a:pPr/>
                 <a14:m>
                   <m:oMathPara xmlns:m="http://schemas.openxmlformats.org/officeDocument/2006/math">
                     <m:oMathParaPr>
@@ -4408,7 +4482,7 @@
             </p:txBody>
           </p:sp>
         </mc:Choice>
-        <mc:Fallback>
+        <mc:Fallback xmlns="">
           <p:sp>
             <p:nvSpPr>
               <p:cNvPr id="4" name="TextBox 3">
@@ -4453,8 +4527,8 @@
           </p:sp>
         </mc:Fallback>
       </mc:AlternateContent>
-      <mc:AlternateContent xmlns:mc="http://schemas.openxmlformats.org/markup-compatibility/2006">
-        <mc:Choice xmlns:a14="http://schemas.microsoft.com/office/drawing/2010/main" Requires="a14">
+      <mc:AlternateContent xmlns:mc="http://schemas.openxmlformats.org/markup-compatibility/2006" xmlns:a14="http://schemas.microsoft.com/office/drawing/2010/main">
+        <mc:Choice Requires="a14">
           <p:sp>
             <p:nvSpPr>
               <p:cNvPr id="5" name="TextBox 4">
@@ -4594,7 +4668,7 @@
             </p:txBody>
           </p:sp>
         </mc:Choice>
-        <mc:Fallback>
+        <mc:Fallback xmlns="">
           <p:sp>
             <p:nvSpPr>
               <p:cNvPr id="5" name="TextBox 4">
@@ -4639,8 +4713,8 @@
           </p:sp>
         </mc:Fallback>
       </mc:AlternateContent>
-      <mc:AlternateContent xmlns:mc="http://schemas.openxmlformats.org/markup-compatibility/2006">
-        <mc:Choice xmlns:a14="http://schemas.microsoft.com/office/drawing/2010/main" Requires="a14">
+      <mc:AlternateContent xmlns:mc="http://schemas.openxmlformats.org/markup-compatibility/2006" xmlns:a14="http://schemas.microsoft.com/office/drawing/2010/main">
+        <mc:Choice Requires="a14">
           <p:sp>
             <p:nvSpPr>
               <p:cNvPr id="15" name="TextBox 14">
@@ -4669,6 +4743,7 @@
               </a:bodyPr>
               <a:lstStyle/>
               <a:p>
+                <a:pPr/>
                 <a14:m>
                   <m:oMathPara xmlns:m="http://schemas.openxmlformats.org/officeDocument/2006/math">
                     <m:oMathParaPr>
@@ -4728,7 +4803,7 @@
                           <a:latin typeface="Cambria Math" panose="02040503050406030204" pitchFamily="18" charset="0"/>
                           <a:ea typeface="Cambria Math" panose="02040503050406030204" pitchFamily="18" charset="0"/>
                         </a:rPr>
-                        <m:t>**(0,</m:t>
+                        <m:t>∗∗(0,</m:t>
                       </m:r>
                       <m:sSub>
                         <m:sSubPr>
@@ -4779,7 +4854,7 @@
             </p:txBody>
           </p:sp>
         </mc:Choice>
-        <mc:Fallback>
+        <mc:Fallback xmlns="">
           <p:sp>
             <p:nvSpPr>
               <p:cNvPr id="15" name="TextBox 14">
@@ -4824,8 +4899,8 @@
           </p:sp>
         </mc:Fallback>
       </mc:AlternateContent>
-      <mc:AlternateContent xmlns:mc="http://schemas.openxmlformats.org/markup-compatibility/2006">
-        <mc:Choice xmlns:a14="http://schemas.microsoft.com/office/drawing/2010/main" Requires="a14">
+      <mc:AlternateContent xmlns:mc="http://schemas.openxmlformats.org/markup-compatibility/2006" xmlns:a14="http://schemas.microsoft.com/office/drawing/2010/main">
+        <mc:Choice Requires="a14">
           <p:sp>
             <p:nvSpPr>
               <p:cNvPr id="20" name="TextBox 19">
@@ -4854,6 +4929,7 @@
               </a:bodyPr>
               <a:lstStyle/>
               <a:p>
+                <a:pPr/>
                 <a14:m>
                   <m:oMathPara xmlns:m="http://schemas.openxmlformats.org/officeDocument/2006/math">
                     <m:oMathParaPr>
@@ -4882,7 +4958,7 @@
             </p:txBody>
           </p:sp>
         </mc:Choice>
-        <mc:Fallback>
+        <mc:Fallback xmlns="">
           <p:sp>
             <p:nvSpPr>
               <p:cNvPr id="20" name="TextBox 19">
@@ -5030,8 +5106,8 @@
           </a:prstGeom>
         </p:spPr>
       </p:pic>
-      <mc:AlternateContent xmlns:mc="http://schemas.openxmlformats.org/markup-compatibility/2006">
-        <mc:Choice xmlns:a14="http://schemas.microsoft.com/office/drawing/2010/main" Requires="a14">
+      <mc:AlternateContent xmlns:mc="http://schemas.openxmlformats.org/markup-compatibility/2006" xmlns:a14="http://schemas.microsoft.com/office/drawing/2010/main">
+        <mc:Choice Requires="a14">
           <p:sp>
             <p:nvSpPr>
               <p:cNvPr id="17" name="TextBox 16">
@@ -5060,6 +5136,7 @@
               </a:bodyPr>
               <a:lstStyle/>
               <a:p>
+                <a:pPr/>
                 <a14:m>
                   <m:oMathPara xmlns:m="http://schemas.openxmlformats.org/officeDocument/2006/math">
                     <m:oMathParaPr>
@@ -5088,7 +5165,7 @@
             </p:txBody>
           </p:sp>
         </mc:Choice>
-        <mc:Fallback>
+        <mc:Fallback xmlns="">
           <p:sp>
             <p:nvSpPr>
               <p:cNvPr id="17" name="TextBox 16">
@@ -5270,8 +5347,8 @@
           <a:chExt cx="0" cy="0"/>
         </a:xfrm>
       </p:grpSpPr>
-      <mc:AlternateContent xmlns:mc="http://schemas.openxmlformats.org/markup-compatibility/2006">
-        <mc:Choice xmlns:a14="http://schemas.microsoft.com/office/drawing/2010/main" Requires="a14">
+      <mc:AlternateContent xmlns:mc="http://schemas.openxmlformats.org/markup-compatibility/2006" xmlns:a14="http://schemas.microsoft.com/office/drawing/2010/main">
+        <mc:Choice Requires="a14">
           <p:sp>
             <p:nvSpPr>
               <p:cNvPr id="4" name="TextBox 3">
@@ -5434,14 +5511,7 @@
                               <a:latin typeface="Cambria Math" panose="02040503050406030204" pitchFamily="18" charset="0"/>
                               <a:ea typeface="Cambria Math" panose="02040503050406030204" pitchFamily="18" charset="0"/>
                             </a:rPr>
-                            <m:t>2</m:t>
-                          </m:r>
-                          <m:r>
-                            <a:rPr lang="en-CA" sz="1600" b="0" i="1" smtClean="0">
-                              <a:latin typeface="Cambria Math" panose="02040503050406030204" pitchFamily="18" charset="0"/>
-                              <a:ea typeface="Cambria Math" panose="02040503050406030204" pitchFamily="18" charset="0"/>
-                            </a:rPr>
-                            <m:t>.58</m:t>
+                            <m:t>2.58</m:t>
                           </m:r>
                         </m:den>
                       </m:f>
@@ -5460,7 +5530,7 @@
             </p:txBody>
           </p:sp>
         </mc:Choice>
-        <mc:Fallback>
+        <mc:Fallback xmlns="">
           <p:sp>
             <p:nvSpPr>
               <p:cNvPr id="4" name="TextBox 3">
@@ -5505,8 +5575,8 @@
           </p:sp>
         </mc:Fallback>
       </mc:AlternateContent>
-      <mc:AlternateContent xmlns:mc="http://schemas.openxmlformats.org/markup-compatibility/2006">
-        <mc:Choice xmlns:a14="http://schemas.microsoft.com/office/drawing/2010/main" Requires="a14">
+      <mc:AlternateContent xmlns:mc="http://schemas.openxmlformats.org/markup-compatibility/2006" xmlns:a14="http://schemas.microsoft.com/office/drawing/2010/main">
+        <mc:Choice Requires="a14">
           <p:sp>
             <p:nvSpPr>
               <p:cNvPr id="5" name="TextBox 4">
@@ -5646,7 +5716,7 @@
             </p:txBody>
           </p:sp>
         </mc:Choice>
-        <mc:Fallback>
+        <mc:Fallback xmlns="">
           <p:sp>
             <p:nvSpPr>
               <p:cNvPr id="5" name="TextBox 4">
@@ -5691,8 +5761,8 @@
           </p:sp>
         </mc:Fallback>
       </mc:AlternateContent>
-      <mc:AlternateContent xmlns:mc="http://schemas.openxmlformats.org/markup-compatibility/2006">
-        <mc:Choice xmlns:a14="http://schemas.microsoft.com/office/drawing/2010/main" Requires="a14">
+      <mc:AlternateContent xmlns:mc="http://schemas.openxmlformats.org/markup-compatibility/2006" xmlns:a14="http://schemas.microsoft.com/office/drawing/2010/main">
+        <mc:Choice Requires="a14">
           <p:sp>
             <p:nvSpPr>
               <p:cNvPr id="17" name="TextBox 16">
@@ -5797,14 +5867,7 @@
                           <a:latin typeface="Cambria Math" panose="02040503050406030204" pitchFamily="18" charset="0"/>
                           <a:ea typeface="Cambria Math" panose="02040503050406030204" pitchFamily="18" charset="0"/>
                         </a:rPr>
-                        <m:t> = </m:t>
-                      </m:r>
-                      <m:r>
-                        <a:rPr lang="en-CA" b="0" i="1" smtClean="0">
-                          <a:latin typeface="Cambria Math" panose="02040503050406030204" pitchFamily="18" charset="0"/>
-                          <a:ea typeface="Cambria Math" panose="02040503050406030204" pitchFamily="18" charset="0"/>
-                        </a:rPr>
-                        <m:t>0.388</m:t>
+                        <m:t> = 0.388</m:t>
                       </m:r>
                     </m:oMath>
                   </m:oMathPara>
@@ -5814,7 +5877,7 @@
             </p:txBody>
           </p:sp>
         </mc:Choice>
-        <mc:Fallback>
+        <mc:Fallback xmlns="">
           <p:sp>
             <p:nvSpPr>
               <p:cNvPr id="17" name="TextBox 16">
@@ -5859,8 +5922,8 @@
           </p:sp>
         </mc:Fallback>
       </mc:AlternateContent>
-      <mc:AlternateContent xmlns:mc="http://schemas.openxmlformats.org/markup-compatibility/2006">
-        <mc:Choice xmlns:a14="http://schemas.microsoft.com/office/drawing/2010/main" Requires="a14">
+      <mc:AlternateContent xmlns:mc="http://schemas.openxmlformats.org/markup-compatibility/2006" xmlns:a14="http://schemas.microsoft.com/office/drawing/2010/main">
+        <mc:Choice Requires="a14">
           <p:sp>
             <p:nvSpPr>
               <p:cNvPr id="2" name="TextBox 1">
@@ -6023,14 +6086,7 @@
                               <a:latin typeface="Cambria Math" panose="02040503050406030204" pitchFamily="18" charset="0"/>
                               <a:ea typeface="Cambria Math" panose="02040503050406030204" pitchFamily="18" charset="0"/>
                             </a:rPr>
-                            <m:t>2</m:t>
-                          </m:r>
-                          <m:r>
-                            <a:rPr lang="en-CA" sz="1600" b="0" i="1" smtClean="0">
-                              <a:latin typeface="Cambria Math" panose="02040503050406030204" pitchFamily="18" charset="0"/>
-                              <a:ea typeface="Cambria Math" panose="02040503050406030204" pitchFamily="18" charset="0"/>
-                            </a:rPr>
-                            <m:t>.58</m:t>
+                            <m:t>2.58</m:t>
                           </m:r>
                         </m:den>
                       </m:f>
@@ -6049,7 +6105,7 @@
             </p:txBody>
           </p:sp>
         </mc:Choice>
-        <mc:Fallback>
+        <mc:Fallback xmlns="">
           <p:sp>
             <p:nvSpPr>
               <p:cNvPr id="2" name="TextBox 1">
@@ -6094,8 +6150,8 @@
           </p:sp>
         </mc:Fallback>
       </mc:AlternateContent>
-      <mc:AlternateContent xmlns:mc="http://schemas.openxmlformats.org/markup-compatibility/2006">
-        <mc:Choice xmlns:a14="http://schemas.microsoft.com/office/drawing/2010/main" Requires="a14">
+      <mc:AlternateContent xmlns:mc="http://schemas.openxmlformats.org/markup-compatibility/2006" xmlns:a14="http://schemas.microsoft.com/office/drawing/2010/main">
+        <mc:Choice Requires="a14">
           <p:sp>
             <p:nvSpPr>
               <p:cNvPr id="3" name="TextBox 2">
@@ -6200,14 +6256,7 @@
                           <a:latin typeface="Cambria Math" panose="02040503050406030204" pitchFamily="18" charset="0"/>
                           <a:ea typeface="Cambria Math" panose="02040503050406030204" pitchFamily="18" charset="0"/>
                         </a:rPr>
-                        <m:t> = 0.</m:t>
-                      </m:r>
-                      <m:r>
-                        <a:rPr lang="en-CA" b="0" i="1" smtClean="0">
-                          <a:latin typeface="Cambria Math" panose="02040503050406030204" pitchFamily="18" charset="0"/>
-                          <a:ea typeface="Cambria Math" panose="02040503050406030204" pitchFamily="18" charset="0"/>
-                        </a:rPr>
-                        <m:t> 166</m:t>
+                        <m:t> = 0. 166</m:t>
                       </m:r>
                     </m:oMath>
                   </m:oMathPara>
@@ -6217,7 +6266,7 @@
             </p:txBody>
           </p:sp>
         </mc:Choice>
-        <mc:Fallback>
+        <mc:Fallback xmlns="">
           <p:sp>
             <p:nvSpPr>
               <p:cNvPr id="3" name="TextBox 2">
@@ -6818,8 +6867,8 @@
           </a:p>
         </p:txBody>
       </p:sp>
-      <mc:AlternateContent xmlns:mc="http://schemas.openxmlformats.org/markup-compatibility/2006">
-        <mc:Choice xmlns:a14="http://schemas.microsoft.com/office/drawing/2010/main" Requires="a14">
+      <mc:AlternateContent xmlns:mc="http://schemas.openxmlformats.org/markup-compatibility/2006" xmlns:a14="http://schemas.microsoft.com/office/drawing/2010/main">
+        <mc:Choice Requires="a14">
           <p:sp>
             <p:nvSpPr>
               <p:cNvPr id="5" name="TextBox 4">
@@ -6848,6 +6897,7 @@
               </a:bodyPr>
               <a:lstStyle/>
               <a:p>
+                <a:pPr/>
                 <a14:m>
                   <m:oMathPara xmlns:m="http://schemas.openxmlformats.org/officeDocument/2006/math">
                     <m:oMathParaPr>
@@ -6907,7 +6957,7 @@
                           <a:latin typeface="Cambria Math" panose="02040503050406030204" pitchFamily="18" charset="0"/>
                           <a:ea typeface="Cambria Math" panose="02040503050406030204" pitchFamily="18" charset="0"/>
                         </a:rPr>
-                        <m:t>**(0,</m:t>
+                        <m:t>∗∗(0,</m:t>
                       </m:r>
                       <m:sSub>
                         <m:sSubPr>
@@ -6958,7 +7008,7 @@
             </p:txBody>
           </p:sp>
         </mc:Choice>
-        <mc:Fallback>
+        <mc:Fallback xmlns="">
           <p:sp>
             <p:nvSpPr>
               <p:cNvPr id="5" name="TextBox 4">
@@ -8318,12 +8368,81 @@
           <a:chExt cx="0" cy="0"/>
         </a:xfrm>
       </p:grpSpPr>
+      <p:sp>
+        <p:nvSpPr>
+          <p:cNvPr id="2" name="Title 1">
+            <a:extLst>
+              <a:ext uri="{FF2B5EF4-FFF2-40B4-BE49-F238E27FC236}">
+                <a16:creationId xmlns:a16="http://schemas.microsoft.com/office/drawing/2014/main" id="{48801276-03FE-BBF6-EAAF-CDF6A8E732EE}"/>
+              </a:ext>
+            </a:extLst>
+          </p:cNvPr>
+          <p:cNvSpPr>
+            <a:spLocks noGrp="1"/>
+          </p:cNvSpPr>
+          <p:nvPr>
+            <p:ph type="title"/>
+          </p:nvPr>
+        </p:nvSpPr>
+        <p:spPr/>
+        <p:txBody>
+          <a:bodyPr/>
+          <a:lstStyle/>
+          <a:p>
+            <a:r>
+              <a:rPr lang="en-US" dirty="0"/>
+              <a:t>Possible identifiability issues</a:t>
+            </a:r>
+          </a:p>
+        </p:txBody>
+      </p:sp>
+      <p:sp>
+        <p:nvSpPr>
+          <p:cNvPr id="3" name="Content Placeholder 2">
+            <a:extLst>
+              <a:ext uri="{FF2B5EF4-FFF2-40B4-BE49-F238E27FC236}">
+                <a16:creationId xmlns:a16="http://schemas.microsoft.com/office/drawing/2014/main" id="{2765D414-A5EF-6E52-C0E1-D749FE4350B2}"/>
+              </a:ext>
+            </a:extLst>
+          </p:cNvPr>
+          <p:cNvSpPr>
+            <a:spLocks noGrp="1"/>
+          </p:cNvSpPr>
+          <p:nvPr>
+            <p:ph idx="1"/>
+          </p:nvPr>
+        </p:nvSpPr>
+        <p:spPr>
+          <a:xfrm>
+            <a:off x="838200" y="1825625"/>
+            <a:ext cx="5799083" cy="4351338"/>
+          </a:xfrm>
+        </p:spPr>
+        <p:txBody>
+          <a:bodyPr/>
+          <a:lstStyle/>
+          <a:p>
+            <a:r>
+              <a:rPr lang="en-US" dirty="0"/>
+              <a:t>Log likelihood is the same for different </a:t>
+            </a:r>
+            <a:r>
+              <a:rPr lang="en-US" dirty="0" err="1"/>
+              <a:t>Rmax</a:t>
+            </a:r>
+            <a:r>
+              <a:rPr lang="en-US" dirty="0"/>
+              <a:t> values – i.e., some parameters “trade-off” to equally explain the data</a:t>
+            </a:r>
+          </a:p>
+        </p:txBody>
+      </p:sp>
       <p:pic>
         <p:nvPicPr>
-          <p:cNvPr id="5" name="Picture 4" descr="A group of blue and green circles&#10;&#10;AI-generated content may be incorrect.">
-            <a:extLst>
-              <a:ext uri="{FF2B5EF4-FFF2-40B4-BE49-F238E27FC236}">
-                <a16:creationId xmlns:a16="http://schemas.microsoft.com/office/drawing/2014/main" id="{906C2F0A-4E83-461A-2E01-76140448FE41}"/>
+          <p:cNvPr id="4" name="Picture 3">
+            <a:extLst>
+              <a:ext uri="{FF2B5EF4-FFF2-40B4-BE49-F238E27FC236}">
+                <a16:creationId xmlns:a16="http://schemas.microsoft.com/office/drawing/2014/main" id="{DB876AFE-E122-F87A-AFC0-232135DCB1C6}"/>
               </a:ext>
             </a:extLst>
           </p:cNvPr>
@@ -8334,99 +8453,24 @@
         </p:nvPicPr>
         <p:blipFill>
           <a:blip r:embed="rId2"/>
-          <a:srcRect l="5235" r="8806"/>
           <a:stretch>
             <a:fillRect/>
           </a:stretch>
         </p:blipFill>
         <p:spPr>
           <a:xfrm>
-            <a:off x="-1" y="0"/>
-            <a:ext cx="12192001" cy="6450227"/>
+            <a:off x="6251508" y="1825625"/>
+            <a:ext cx="5940492" cy="4525257"/>
           </a:xfrm>
           <a:prstGeom prst="rect">
             <a:avLst/>
           </a:prstGeom>
         </p:spPr>
       </p:pic>
-      <p:sp>
-        <p:nvSpPr>
-          <p:cNvPr id="8" name="TextBox 7">
-            <a:extLst>
-              <a:ext uri="{FF2B5EF4-FFF2-40B4-BE49-F238E27FC236}">
-                <a16:creationId xmlns:a16="http://schemas.microsoft.com/office/drawing/2014/main" id="{CD88A4AF-C3C4-3CF8-0107-88441B6F664D}"/>
-              </a:ext>
-            </a:extLst>
-          </p:cNvPr>
-          <p:cNvSpPr txBox="1"/>
-          <p:nvPr/>
-        </p:nvSpPr>
-        <p:spPr>
-          <a:xfrm>
-            <a:off x="8723870" y="6450227"/>
-            <a:ext cx="3372333" cy="369332"/>
-          </a:xfrm>
-          <a:prstGeom prst="rect">
-            <a:avLst/>
-          </a:prstGeom>
-          <a:noFill/>
-        </p:spPr>
-        <p:txBody>
-          <a:bodyPr wrap="none" rtlCol="0">
-            <a:spAutoFit/>
-          </a:bodyPr>
-          <a:lstStyle/>
-          <a:p>
-            <a:r>
-              <a:rPr lang="en-US" dirty="0"/>
-              <a:t>With “uniform” prior on distance</a:t>
-            </a:r>
-          </a:p>
-        </p:txBody>
-      </p:sp>
-      <p:sp>
-        <p:nvSpPr>
-          <p:cNvPr id="9" name="TextBox 8">
-            <a:extLst>
-              <a:ext uri="{FF2B5EF4-FFF2-40B4-BE49-F238E27FC236}">
-                <a16:creationId xmlns:a16="http://schemas.microsoft.com/office/drawing/2014/main" id="{FCA5104F-AC4A-8A3A-C6B8-8F6FF872F71C}"/>
-              </a:ext>
-            </a:extLst>
-          </p:cNvPr>
-          <p:cNvSpPr txBox="1"/>
-          <p:nvPr/>
-        </p:nvSpPr>
-        <p:spPr>
-          <a:xfrm>
-            <a:off x="1594022" y="407773"/>
-            <a:ext cx="1335622" cy="369332"/>
-          </a:xfrm>
-          <a:prstGeom prst="rect">
-            <a:avLst/>
-          </a:prstGeom>
-          <a:noFill/>
-        </p:spPr>
-        <p:txBody>
-          <a:bodyPr wrap="none" rtlCol="0">
-            <a:spAutoFit/>
-          </a:bodyPr>
-          <a:lstStyle/>
-          <a:p>
-            <a:r>
-              <a:rPr lang="en-US" dirty="0">
-                <a:solidFill>
-                  <a:schemeClr val="bg1"/>
-                </a:solidFill>
-              </a:rPr>
-              <a:t>All colonies</a:t>
-            </a:r>
-          </a:p>
-        </p:txBody>
-      </p:sp>
     </p:spTree>
     <p:extLst>
       <p:ext uri="{BB962C8B-B14F-4D97-AF65-F5344CB8AC3E}">
-        <p14:creationId xmlns:p14="http://schemas.microsoft.com/office/powerpoint/2010/main" val="2494711743"/>
+        <p14:creationId xmlns:p14="http://schemas.microsoft.com/office/powerpoint/2010/main" val="376886769"/>
       </p:ext>
     </p:extLst>
   </p:cSld>
@@ -8458,7 +8502,7 @@
           <p:cNvPr id="4" name="Picture 3">
             <a:extLst>
               <a:ext uri="{FF2B5EF4-FFF2-40B4-BE49-F238E27FC236}">
-                <a16:creationId xmlns:a16="http://schemas.microsoft.com/office/drawing/2014/main" id="{35DA2925-E907-4B97-DDB1-DBEFE5D07282}"/>
+                <a16:creationId xmlns:a16="http://schemas.microsoft.com/office/drawing/2014/main" id="{47500B1E-BB1C-4EE3-852F-5FB90E399B37}"/>
               </a:ext>
             </a:extLst>
           </p:cNvPr>
@@ -8468,18 +8512,15 @@
           <p:nvPr/>
         </p:nvPicPr>
         <p:blipFill>
-          <a:blip r:embed="rId2">
-            <a:alphaModFix/>
-          </a:blip>
-          <a:srcRect r="3944"/>
+          <a:blip r:embed="rId2"/>
           <a:stretch>
             <a:fillRect/>
           </a:stretch>
         </p:blipFill>
         <p:spPr>
           <a:xfrm>
-            <a:off x="14143" y="12310"/>
-            <a:ext cx="12177857" cy="6450226"/>
+            <a:off x="5104576" y="0"/>
+            <a:ext cx="6893049" cy="6858000"/>
           </a:xfrm>
           <a:prstGeom prst="rect">
             <a:avLst/>
@@ -8488,82 +8529,33 @@
       </p:pic>
       <p:sp>
         <p:nvSpPr>
-          <p:cNvPr id="5" name="TextBox 4">
-            <a:extLst>
-              <a:ext uri="{FF2B5EF4-FFF2-40B4-BE49-F238E27FC236}">
-                <a16:creationId xmlns:a16="http://schemas.microsoft.com/office/drawing/2014/main" id="{529D999A-82CF-20C9-4AFC-E76B60B59CA6}"/>
-              </a:ext>
-            </a:extLst>
-          </p:cNvPr>
-          <p:cNvSpPr txBox="1"/>
-          <p:nvPr/>
+          <p:cNvPr id="3" name="Title 1">
+            <a:extLst>
+              <a:ext uri="{FF2B5EF4-FFF2-40B4-BE49-F238E27FC236}">
+                <a16:creationId xmlns:a16="http://schemas.microsoft.com/office/drawing/2014/main" id="{F62EA019-F859-E901-16FF-9CE14A2433CF}"/>
+              </a:ext>
+            </a:extLst>
+          </p:cNvPr>
+          <p:cNvSpPr>
+            <a:spLocks noGrp="1"/>
+          </p:cNvSpPr>
+          <p:nvPr>
+            <p:ph type="title"/>
+          </p:nvPr>
         </p:nvSpPr>
         <p:spPr>
           <a:xfrm>
-            <a:off x="1594022" y="407773"/>
-            <a:ext cx="1335622" cy="369332"/>
+            <a:off x="194375" y="0"/>
+            <a:ext cx="4740880" cy="2605414"/>
           </a:xfrm>
-          <a:prstGeom prst="rect">
-            <a:avLst/>
-          </a:prstGeom>
-          <a:noFill/>
         </p:spPr>
         <p:txBody>
-          <a:bodyPr wrap="none" rtlCol="0">
-            <a:spAutoFit/>
-          </a:bodyPr>
+          <a:bodyPr/>
           <a:lstStyle/>
           <a:p>
             <a:r>
-              <a:rPr lang="en-US" dirty="0">
-                <a:solidFill>
-                  <a:schemeClr val="bg1"/>
-                </a:solidFill>
-              </a:rPr>
-              <a:t>All colonies</a:t>
-            </a:r>
-          </a:p>
-        </p:txBody>
-      </p:sp>
-      <p:sp>
-        <p:nvSpPr>
-          <p:cNvPr id="6" name="TextBox 5">
-            <a:extLst>
-              <a:ext uri="{FF2B5EF4-FFF2-40B4-BE49-F238E27FC236}">
-                <a16:creationId xmlns:a16="http://schemas.microsoft.com/office/drawing/2014/main" id="{31AFB87E-2870-385D-4139-E8073696BC19}"/>
-              </a:ext>
-            </a:extLst>
-          </p:cNvPr>
-          <p:cNvSpPr txBox="1"/>
-          <p:nvPr/>
-        </p:nvSpPr>
-        <p:spPr>
-          <a:xfrm>
-            <a:off x="8723870" y="6450227"/>
-            <a:ext cx="3502241" cy="369332"/>
-          </a:xfrm>
-          <a:prstGeom prst="rect">
-            <a:avLst/>
-          </a:prstGeom>
-          <a:noFill/>
-        </p:spPr>
-        <p:txBody>
-          <a:bodyPr wrap="none" rtlCol="0">
-            <a:spAutoFit/>
-          </a:bodyPr>
-          <a:lstStyle/>
-          <a:p>
-            <a:r>
               <a:rPr lang="en-US" dirty="0"/>
-              <a:t>With </a:t>
-            </a:r>
-            <a:r>
-              <a:rPr lang="en-US" dirty="0" err="1"/>
-              <a:t>halfnormal</a:t>
-            </a:r>
-            <a:r>
-              <a:rPr lang="en-US" dirty="0"/>
-              <a:t> prior on distance</a:t>
+              <a:t>Are the data informative on the model?</a:t>
             </a:r>
           </a:p>
         </p:txBody>
@@ -8571,7 +8563,7 @@
     </p:spTree>
     <p:extLst>
       <p:ext uri="{BB962C8B-B14F-4D97-AF65-F5344CB8AC3E}">
-        <p14:creationId xmlns:p14="http://schemas.microsoft.com/office/powerpoint/2010/main" val="1073753470"/>
+        <p14:creationId xmlns:p14="http://schemas.microsoft.com/office/powerpoint/2010/main" val="3800070388"/>
       </p:ext>
     </p:extLst>
   </p:cSld>
@@ -8598,12 +8590,45 @@
           <a:chExt cx="0" cy="0"/>
         </a:xfrm>
       </p:grpSpPr>
+      <p:sp>
+        <p:nvSpPr>
+          <p:cNvPr id="2" name="Title 1">
+            <a:extLst>
+              <a:ext uri="{FF2B5EF4-FFF2-40B4-BE49-F238E27FC236}">
+                <a16:creationId xmlns:a16="http://schemas.microsoft.com/office/drawing/2014/main" id="{1963DF3E-E9EF-6E58-068D-C33FFD7A258A}"/>
+              </a:ext>
+            </a:extLst>
+          </p:cNvPr>
+          <p:cNvSpPr>
+            <a:spLocks noGrp="1"/>
+          </p:cNvSpPr>
+          <p:nvPr>
+            <p:ph type="title"/>
+          </p:nvPr>
+        </p:nvSpPr>
+        <p:spPr>
+          <a:xfrm>
+            <a:off x="838200" y="14397"/>
+            <a:ext cx="10515600" cy="1325563"/>
+          </a:xfrm>
+        </p:spPr>
+        <p:txBody>
+          <a:bodyPr/>
+          <a:lstStyle/>
+          <a:p>
+            <a:r>
+              <a:rPr lang="en-US" dirty="0"/>
+              <a:t>Pairs plots – rho vs sigma</a:t>
+            </a:r>
+          </a:p>
+        </p:txBody>
+      </p:sp>
       <p:pic>
         <p:nvPicPr>
           <p:cNvPr id="4" name="Picture 3">
             <a:extLst>
               <a:ext uri="{FF2B5EF4-FFF2-40B4-BE49-F238E27FC236}">
-                <a16:creationId xmlns:a16="http://schemas.microsoft.com/office/drawing/2014/main" id="{8043A77D-44DF-C705-75F0-02B6AC097D02}"/>
+                <a16:creationId xmlns:a16="http://schemas.microsoft.com/office/drawing/2014/main" id="{E52F1A5B-5ECA-26CB-AF81-5B64C2A04E89}"/>
               </a:ext>
             </a:extLst>
           </p:cNvPr>
@@ -8613,17 +8638,15 @@
           <p:nvPr/>
         </p:nvPicPr>
         <p:blipFill>
-          <a:blip r:embed="rId2">
-            <a:alphaModFix/>
-          </a:blip>
+          <a:blip r:embed="rId2"/>
           <a:stretch>
             <a:fillRect/>
           </a:stretch>
         </p:blipFill>
         <p:spPr>
           <a:xfrm>
-            <a:off x="-704335" y="0"/>
-            <a:ext cx="14111416" cy="6450227"/>
+            <a:off x="1853851" y="1465545"/>
+            <a:ext cx="6819655" cy="5194973"/>
           </a:xfrm>
           <a:prstGeom prst="rect">
             <a:avLst/>
@@ -8633,7 +8656,7 @@
     </p:spTree>
     <p:extLst>
       <p:ext uri="{BB962C8B-B14F-4D97-AF65-F5344CB8AC3E}">
-        <p14:creationId xmlns:p14="http://schemas.microsoft.com/office/powerpoint/2010/main" val="3884319733"/>
+        <p14:creationId xmlns:p14="http://schemas.microsoft.com/office/powerpoint/2010/main" val="1714201548"/>
       </p:ext>
     </p:extLst>
   </p:cSld>
@@ -8662,10 +8685,10 @@
       </p:grpSpPr>
       <p:pic>
         <p:nvPicPr>
-          <p:cNvPr id="4" name="Picture 3">
-            <a:extLst>
-              <a:ext uri="{FF2B5EF4-FFF2-40B4-BE49-F238E27FC236}">
-                <a16:creationId xmlns:a16="http://schemas.microsoft.com/office/drawing/2014/main" id="{47500B1E-BB1C-4EE3-852F-5FB90E399B37}"/>
+          <p:cNvPr id="5" name="Picture 4" descr="A group of blue and green circles&#10;&#10;AI-generated content may be incorrect.">
+            <a:extLst>
+              <a:ext uri="{FF2B5EF4-FFF2-40B4-BE49-F238E27FC236}">
+                <a16:creationId xmlns:a16="http://schemas.microsoft.com/office/drawing/2014/main" id="{906C2F0A-4E83-461A-2E01-76140448FE41}"/>
               </a:ext>
             </a:extLst>
           </p:cNvPr>
@@ -8676,24 +8699,244 @@
         </p:nvPicPr>
         <p:blipFill>
           <a:blip r:embed="rId2"/>
+          <a:srcRect l="5235" r="8806"/>
           <a:stretch>
             <a:fillRect/>
           </a:stretch>
         </p:blipFill>
         <p:spPr>
           <a:xfrm>
-            <a:off x="2649475" y="0"/>
-            <a:ext cx="6893049" cy="6858000"/>
+            <a:off x="-1" y="0"/>
+            <a:ext cx="12192001" cy="6450227"/>
           </a:xfrm>
           <a:prstGeom prst="rect">
             <a:avLst/>
           </a:prstGeom>
         </p:spPr>
       </p:pic>
+      <p:sp>
+        <p:nvSpPr>
+          <p:cNvPr id="8" name="TextBox 7">
+            <a:extLst>
+              <a:ext uri="{FF2B5EF4-FFF2-40B4-BE49-F238E27FC236}">
+                <a16:creationId xmlns:a16="http://schemas.microsoft.com/office/drawing/2014/main" id="{CD88A4AF-C3C4-3CF8-0107-88441B6F664D}"/>
+              </a:ext>
+            </a:extLst>
+          </p:cNvPr>
+          <p:cNvSpPr txBox="1"/>
+          <p:nvPr/>
+        </p:nvSpPr>
+        <p:spPr>
+          <a:xfrm>
+            <a:off x="8723870" y="6450227"/>
+            <a:ext cx="3372333" cy="369332"/>
+          </a:xfrm>
+          <a:prstGeom prst="rect">
+            <a:avLst/>
+          </a:prstGeom>
+          <a:noFill/>
+        </p:spPr>
+        <p:txBody>
+          <a:bodyPr wrap="none" rtlCol="0">
+            <a:spAutoFit/>
+          </a:bodyPr>
+          <a:lstStyle/>
+          <a:p>
+            <a:r>
+              <a:rPr lang="en-US" dirty="0"/>
+              <a:t>With “uniform” prior on distance</a:t>
+            </a:r>
+          </a:p>
+        </p:txBody>
+      </p:sp>
+      <p:sp>
+        <p:nvSpPr>
+          <p:cNvPr id="9" name="TextBox 8">
+            <a:extLst>
+              <a:ext uri="{FF2B5EF4-FFF2-40B4-BE49-F238E27FC236}">
+                <a16:creationId xmlns:a16="http://schemas.microsoft.com/office/drawing/2014/main" id="{FCA5104F-AC4A-8A3A-C6B8-8F6FF872F71C}"/>
+              </a:ext>
+            </a:extLst>
+          </p:cNvPr>
+          <p:cNvSpPr txBox="1"/>
+          <p:nvPr/>
+        </p:nvSpPr>
+        <p:spPr>
+          <a:xfrm>
+            <a:off x="1594022" y="407773"/>
+            <a:ext cx="1335622" cy="369332"/>
+          </a:xfrm>
+          <a:prstGeom prst="rect">
+            <a:avLst/>
+          </a:prstGeom>
+          <a:noFill/>
+        </p:spPr>
+        <p:txBody>
+          <a:bodyPr wrap="none" rtlCol="0">
+            <a:spAutoFit/>
+          </a:bodyPr>
+          <a:lstStyle/>
+          <a:p>
+            <a:r>
+              <a:rPr lang="en-US" dirty="0">
+                <a:solidFill>
+                  <a:schemeClr val="bg1"/>
+                </a:solidFill>
+              </a:rPr>
+              <a:t>All colonies</a:t>
+            </a:r>
+          </a:p>
+        </p:txBody>
+      </p:sp>
     </p:spTree>
     <p:extLst>
       <p:ext uri="{BB962C8B-B14F-4D97-AF65-F5344CB8AC3E}">
-        <p14:creationId xmlns:p14="http://schemas.microsoft.com/office/powerpoint/2010/main" val="3800070388"/>
+        <p14:creationId xmlns:p14="http://schemas.microsoft.com/office/powerpoint/2010/main" val="2494711743"/>
+      </p:ext>
+    </p:extLst>
+  </p:cSld>
+  <p:clrMapOvr>
+    <a:masterClrMapping/>
+  </p:clrMapOvr>
+</p:sld>
+</file>
+
+<file path=ppt/slides/slide9.xml><?xml version="1.0" encoding="utf-8"?>
+<p:sld xmlns:a="http://schemas.openxmlformats.org/drawingml/2006/main" xmlns:r="http://schemas.openxmlformats.org/officeDocument/2006/relationships" xmlns:p="http://schemas.openxmlformats.org/presentationml/2006/main">
+  <p:cSld>
+    <p:spTree>
+      <p:nvGrpSpPr>
+        <p:cNvPr id="1" name=""/>
+        <p:cNvGrpSpPr/>
+        <p:nvPr/>
+      </p:nvGrpSpPr>
+      <p:grpSpPr>
+        <a:xfrm>
+          <a:off x="0" y="0"/>
+          <a:ext cx="0" cy="0"/>
+          <a:chOff x="0" y="0"/>
+          <a:chExt cx="0" cy="0"/>
+        </a:xfrm>
+      </p:grpSpPr>
+      <p:pic>
+        <p:nvPicPr>
+          <p:cNvPr id="4" name="Picture 3">
+            <a:extLst>
+              <a:ext uri="{FF2B5EF4-FFF2-40B4-BE49-F238E27FC236}">
+                <a16:creationId xmlns:a16="http://schemas.microsoft.com/office/drawing/2014/main" id="{35DA2925-E907-4B97-DDB1-DBEFE5D07282}"/>
+              </a:ext>
+            </a:extLst>
+          </p:cNvPr>
+          <p:cNvPicPr>
+            <a:picLocks noChangeAspect="1"/>
+          </p:cNvPicPr>
+          <p:nvPr/>
+        </p:nvPicPr>
+        <p:blipFill>
+          <a:blip r:embed="rId2">
+            <a:alphaModFix/>
+          </a:blip>
+          <a:srcRect r="3944"/>
+          <a:stretch>
+            <a:fillRect/>
+          </a:stretch>
+        </p:blipFill>
+        <p:spPr>
+          <a:xfrm>
+            <a:off x="14143" y="12310"/>
+            <a:ext cx="12177857" cy="6450226"/>
+          </a:xfrm>
+          <a:prstGeom prst="rect">
+            <a:avLst/>
+          </a:prstGeom>
+        </p:spPr>
+      </p:pic>
+      <p:sp>
+        <p:nvSpPr>
+          <p:cNvPr id="5" name="TextBox 4">
+            <a:extLst>
+              <a:ext uri="{FF2B5EF4-FFF2-40B4-BE49-F238E27FC236}">
+                <a16:creationId xmlns:a16="http://schemas.microsoft.com/office/drawing/2014/main" id="{529D999A-82CF-20C9-4AFC-E76B60B59CA6}"/>
+              </a:ext>
+            </a:extLst>
+          </p:cNvPr>
+          <p:cNvSpPr txBox="1"/>
+          <p:nvPr/>
+        </p:nvSpPr>
+        <p:spPr>
+          <a:xfrm>
+            <a:off x="1594022" y="407773"/>
+            <a:ext cx="1335622" cy="369332"/>
+          </a:xfrm>
+          <a:prstGeom prst="rect">
+            <a:avLst/>
+          </a:prstGeom>
+          <a:noFill/>
+        </p:spPr>
+        <p:txBody>
+          <a:bodyPr wrap="none" rtlCol="0">
+            <a:spAutoFit/>
+          </a:bodyPr>
+          <a:lstStyle/>
+          <a:p>
+            <a:r>
+              <a:rPr lang="en-US" dirty="0">
+                <a:solidFill>
+                  <a:schemeClr val="bg1"/>
+                </a:solidFill>
+              </a:rPr>
+              <a:t>All colonies</a:t>
+            </a:r>
+          </a:p>
+        </p:txBody>
+      </p:sp>
+      <p:sp>
+        <p:nvSpPr>
+          <p:cNvPr id="6" name="TextBox 5">
+            <a:extLst>
+              <a:ext uri="{FF2B5EF4-FFF2-40B4-BE49-F238E27FC236}">
+                <a16:creationId xmlns:a16="http://schemas.microsoft.com/office/drawing/2014/main" id="{31AFB87E-2870-385D-4139-E8073696BC19}"/>
+              </a:ext>
+            </a:extLst>
+          </p:cNvPr>
+          <p:cNvSpPr txBox="1"/>
+          <p:nvPr/>
+        </p:nvSpPr>
+        <p:spPr>
+          <a:xfrm>
+            <a:off x="8723870" y="6450227"/>
+            <a:ext cx="3502241" cy="369332"/>
+          </a:xfrm>
+          <a:prstGeom prst="rect">
+            <a:avLst/>
+          </a:prstGeom>
+          <a:noFill/>
+        </p:spPr>
+        <p:txBody>
+          <a:bodyPr wrap="none" rtlCol="0">
+            <a:spAutoFit/>
+          </a:bodyPr>
+          <a:lstStyle/>
+          <a:p>
+            <a:r>
+              <a:rPr lang="en-US" dirty="0"/>
+              <a:t>With </a:t>
+            </a:r>
+            <a:r>
+              <a:rPr lang="en-US" dirty="0" err="1"/>
+              <a:t>halfnormal</a:t>
+            </a:r>
+            <a:r>
+              <a:rPr lang="en-US" dirty="0"/>
+              <a:t> prior on distance</a:t>
+            </a:r>
+          </a:p>
+        </p:txBody>
+      </p:sp>
+    </p:spTree>
+    <p:extLst>
+      <p:ext uri="{BB962C8B-B14F-4D97-AF65-F5344CB8AC3E}">
+        <p14:creationId xmlns:p14="http://schemas.microsoft.com/office/powerpoint/2010/main" val="1073753470"/>
       </p:ext>
     </p:extLst>
   </p:cSld>

</xml_diff>